<commit_message>
edited the presentation, added some pics from markdown for pptx
</commit_message>
<xml_diff>
--- a/docs/final_presentation.pptx
+++ b/docs/final_presentation.pptx
@@ -11,6 +11,7 @@
     <p:sldId id="259" r:id="rId5"/>
     <p:sldId id="260" r:id="rId6"/>
     <p:sldId id="261" r:id="rId7"/>
+    <p:sldId id="262" r:id="rId8"/>
   </p:sldIdLst>
   <p:sldSz cx="12192000" cy="6858000"/>
   <p:notesSz cx="6858000" cy="9144000"/>
@@ -1520,7 +1521,7 @@
           <a:lstStyle/>
           <a:p>
             <a:r>
-              <a:rPr lang="de-DE"/>
+              <a:rPr lang="de-DE" dirty="0"/>
               <a:t>Mastertitelformat bearbeiten</a:t>
             </a:r>
           </a:p>
@@ -3344,7 +3345,7 @@
         </p:nvSpPr>
         <p:spPr>
           <a:xfrm>
-            <a:off x="5860868" y="1122363"/>
+            <a:off x="6287075" y="459811"/>
             <a:ext cx="4807132" cy="2387600"/>
           </a:xfrm>
         </p:spPr>
@@ -3385,7 +3386,7 @@
         </p:nvSpPr>
         <p:spPr>
           <a:xfrm>
-            <a:off x="5860868" y="3602037"/>
+            <a:off x="6287075" y="2939485"/>
             <a:ext cx="4807131" cy="2562413"/>
           </a:xfrm>
         </p:spPr>
@@ -3398,7 +3399,9 @@
               <a:buChar char="§"/>
             </a:pPr>
             <a:r>
-              <a:rPr lang="de-DE" dirty="0"/>
+              <a:rPr lang="de-DE" dirty="0">
+                <a:latin typeface="+mj-lt"/>
+              </a:rPr>
               <a:t>Situation</a:t>
             </a:r>
           </a:p>
@@ -3408,7 +3411,9 @@
               <a:buChar char="§"/>
             </a:pPr>
             <a:r>
-              <a:rPr lang="de-DE" dirty="0"/>
+              <a:rPr lang="de-DE" dirty="0">
+                <a:latin typeface="+mj-lt"/>
+              </a:rPr>
               <a:t>Solution</a:t>
             </a:r>
           </a:p>
@@ -3418,10 +3423,35 @@
               <a:buChar char="§"/>
             </a:pPr>
             <a:r>
-              <a:rPr lang="de-DE" dirty="0" err="1"/>
+              <a:rPr lang="de-DE" dirty="0" err="1">
+                <a:latin typeface="+mj-lt"/>
+              </a:rPr>
               <a:t>Results</a:t>
             </a:r>
-            <a:endParaRPr lang="de-DE" dirty="0"/>
+            <a:endParaRPr lang="de-DE" dirty="0">
+              <a:latin typeface="+mj-lt"/>
+            </a:endParaRPr>
+          </a:p>
+          <a:p>
+            <a:pPr marL="342900" indent="-342900" algn="l">
+              <a:buFont typeface="Wingdings" panose="05000000000000000000" pitchFamily="2" charset="2"/>
+              <a:buChar char="§"/>
+            </a:pPr>
+            <a:r>
+              <a:rPr lang="de-DE" dirty="0">
+                <a:latin typeface="+mj-lt"/>
+              </a:rPr>
+              <a:t>Next </a:t>
+            </a:r>
+            <a:r>
+              <a:rPr lang="de-DE" dirty="0" err="1">
+                <a:latin typeface="+mj-lt"/>
+              </a:rPr>
+              <a:t>Steps</a:t>
+            </a:r>
+            <a:endParaRPr lang="de-DE" dirty="0">
+              <a:latin typeface="+mj-lt"/>
+            </a:endParaRPr>
           </a:p>
         </p:txBody>
       </p:sp>
@@ -3439,7 +3469,7 @@
         </p:nvSpPr>
         <p:spPr>
           <a:xfrm>
-            <a:off x="766503" y="2967335"/>
+            <a:off x="766503" y="2641868"/>
             <a:ext cx="4065094" cy="923330"/>
           </a:xfrm>
           <a:prstGeom prst="rect">
@@ -3468,6 +3498,94 @@
           </a:p>
         </p:txBody>
       </p:sp>
+      <p:sp>
+        <p:nvSpPr>
+          <p:cNvPr id="5" name="Textfeld 4">
+            <a:extLst>
+              <a:ext uri="{FF2B5EF4-FFF2-40B4-BE49-F238E27FC236}">
+                <a16:creationId xmlns:a16="http://schemas.microsoft.com/office/drawing/2014/main" id="{2F3C6A8B-9AF5-4630-93C5-71B0BD3D0201}"/>
+              </a:ext>
+            </a:extLst>
+          </p:cNvPr>
+          <p:cNvSpPr txBox="1"/>
+          <p:nvPr/>
+        </p:nvSpPr>
+        <p:spPr>
+          <a:xfrm>
+            <a:off x="825285" y="3707967"/>
+            <a:ext cx="3851329" cy="646331"/>
+          </a:xfrm>
+          <a:prstGeom prst="rect">
+            <a:avLst/>
+          </a:prstGeom>
+          <a:noFill/>
+        </p:spPr>
+        <p:txBody>
+          <a:bodyPr wrap="square" rtlCol="0">
+            <a:spAutoFit/>
+          </a:bodyPr>
+          <a:lstStyle/>
+          <a:p>
+            <a:r>
+              <a:rPr lang="de-DE" dirty="0" err="1">
+                <a:latin typeface="+mj-lt"/>
+              </a:rPr>
+              <a:t>Identifying</a:t>
+            </a:r>
+            <a:r>
+              <a:rPr lang="de-DE" dirty="0">
+                <a:latin typeface="+mj-lt"/>
+              </a:rPr>
+              <a:t> </a:t>
+            </a:r>
+            <a:r>
+              <a:rPr lang="en-US" dirty="0">
+                <a:latin typeface="+mj-lt"/>
+              </a:rPr>
+              <a:t>Identification of future insolvent companies </a:t>
+            </a:r>
+            <a:endParaRPr lang="de-DE" dirty="0">
+              <a:latin typeface="+mj-lt"/>
+            </a:endParaRPr>
+          </a:p>
+        </p:txBody>
+      </p:sp>
+      <p:cxnSp>
+        <p:nvCxnSpPr>
+          <p:cNvPr id="7" name="Gerader Verbinder 6">
+            <a:extLst>
+              <a:ext uri="{FF2B5EF4-FFF2-40B4-BE49-F238E27FC236}">
+                <a16:creationId xmlns:a16="http://schemas.microsoft.com/office/drawing/2014/main" id="{C8233BEA-25B5-4465-8B36-88B602A1BFCF}"/>
+              </a:ext>
+            </a:extLst>
+          </p:cNvPr>
+          <p:cNvCxnSpPr/>
+          <p:nvPr/>
+        </p:nvCxnSpPr>
+        <p:spPr>
+          <a:xfrm>
+            <a:off x="5895741" y="2556"/>
+            <a:ext cx="0" cy="6858000"/>
+          </a:xfrm>
+          <a:prstGeom prst="line">
+            <a:avLst/>
+          </a:prstGeom>
+        </p:spPr>
+        <p:style>
+          <a:lnRef idx="1">
+            <a:schemeClr val="dk1"/>
+          </a:lnRef>
+          <a:fillRef idx="0">
+            <a:schemeClr val="dk1"/>
+          </a:fillRef>
+          <a:effectRef idx="0">
+            <a:schemeClr val="dk1"/>
+          </a:effectRef>
+          <a:fontRef idx="minor">
+            <a:schemeClr val="tx1"/>
+          </a:fontRef>
+        </p:style>
+      </p:cxnSp>
     </p:spTree>
     <p:extLst>
       <p:ext uri="{BB962C8B-B14F-4D97-AF65-F5344CB8AC3E}">
@@ -3535,44 +3653,6 @@
       </p:sp>
       <p:sp>
         <p:nvSpPr>
-          <p:cNvPr id="5" name="Inhaltsplatzhalter 4">
-            <a:extLst>
-              <a:ext uri="{FF2B5EF4-FFF2-40B4-BE49-F238E27FC236}">
-                <a16:creationId xmlns:a16="http://schemas.microsoft.com/office/drawing/2014/main" id="{0F615D91-DCC0-42C6-85C6-0960A564BE37}"/>
-              </a:ext>
-            </a:extLst>
-          </p:cNvPr>
-          <p:cNvSpPr>
-            <a:spLocks noGrp="1"/>
-          </p:cNvSpPr>
-          <p:nvPr>
-            <p:ph idx="1"/>
-          </p:nvPr>
-        </p:nvSpPr>
-        <p:spPr>
-          <a:xfrm>
-            <a:off x="838199" y="1825625"/>
-            <a:ext cx="4710193" cy="274395"/>
-          </a:xfrm>
-        </p:spPr>
-        <p:txBody>
-          <a:bodyPr>
-            <a:normAutofit fontScale="55000" lnSpcReduction="20000"/>
-          </a:bodyPr>
-          <a:lstStyle/>
-          <a:p>
-            <a:pPr marL="0" indent="0">
-              <a:buNone/>
-            </a:pPr>
-            <a:r>
-              <a:rPr lang="de-DE" dirty="0"/>
-              <a:t>Hier die Grafik der Insolvenzen im Zeitverlauf darstellen</a:t>
-            </a:r>
-          </a:p>
-        </p:txBody>
-      </p:sp>
-      <p:sp>
-        <p:nvSpPr>
           <p:cNvPr id="6" name="Titel 3">
             <a:extLst>
               <a:ext uri="{FF2B5EF4-FFF2-40B4-BE49-F238E27FC236}">
@@ -3790,406 +3870,1386 @@
       </p:sp>
       <p:sp>
         <p:nvSpPr>
-          <p:cNvPr id="9" name="Inhaltsplatzhalter 4">
-            <a:extLst>
-              <a:ext uri="{FF2B5EF4-FFF2-40B4-BE49-F238E27FC236}">
-                <a16:creationId xmlns:a16="http://schemas.microsoft.com/office/drawing/2014/main" id="{B248A638-B405-46DD-9758-47F8FCA012FF}"/>
-              </a:ext>
-            </a:extLst>
-          </p:cNvPr>
-          <p:cNvSpPr txBox="1">
-            <a:spLocks/>
-          </p:cNvSpPr>
+          <p:cNvPr id="12" name="Textfeld 11">
+            <a:extLst>
+              <a:ext uri="{FF2B5EF4-FFF2-40B4-BE49-F238E27FC236}">
+                <a16:creationId xmlns:a16="http://schemas.microsoft.com/office/drawing/2014/main" id="{BFBE3AE4-A59C-46B1-9776-2EE141134B4D}"/>
+              </a:ext>
+            </a:extLst>
+          </p:cNvPr>
+          <p:cNvSpPr txBox="1"/>
           <p:nvPr/>
         </p:nvSpPr>
         <p:spPr>
           <a:xfrm>
-            <a:off x="1149457" y="4620783"/>
-            <a:ext cx="4710193" cy="274395"/>
+            <a:off x="838200" y="1376441"/>
+            <a:ext cx="4710193" cy="400110"/>
+          </a:xfrm>
+          <a:prstGeom prst="rect">
+            <a:avLst/>
+          </a:prstGeom>
+          <a:noFill/>
+        </p:spPr>
+        <p:txBody>
+          <a:bodyPr wrap="square" rtlCol="0">
+            <a:spAutoFit/>
+          </a:bodyPr>
+          <a:lstStyle/>
+          <a:p>
+            <a:r>
+              <a:rPr lang="de-DE" sz="2000" dirty="0">
+                <a:latin typeface="+mj-lt"/>
+              </a:rPr>
+              <a:t>Problems</a:t>
+            </a:r>
+          </a:p>
+        </p:txBody>
+      </p:sp>
+      <p:sp>
+        <p:nvSpPr>
+          <p:cNvPr id="13" name="Textfeld 12">
+            <a:extLst>
+              <a:ext uri="{FF2B5EF4-FFF2-40B4-BE49-F238E27FC236}">
+                <a16:creationId xmlns:a16="http://schemas.microsoft.com/office/drawing/2014/main" id="{60C8AEDE-977D-4FC4-809F-A25EB7FADD9B}"/>
+              </a:ext>
+            </a:extLst>
+          </p:cNvPr>
+          <p:cNvSpPr txBox="1"/>
+          <p:nvPr/>
+        </p:nvSpPr>
+        <p:spPr>
+          <a:xfrm>
+            <a:off x="1969581" y="5737365"/>
+            <a:ext cx="8724249" cy="338554"/>
+          </a:xfrm>
+          <a:prstGeom prst="rect">
+            <a:avLst/>
+          </a:prstGeom>
+          <a:noFill/>
+        </p:spPr>
+        <p:txBody>
+          <a:bodyPr wrap="square" rtlCol="0">
+            <a:spAutoFit/>
+          </a:bodyPr>
+          <a:lstStyle/>
+          <a:p>
+            <a:r>
+              <a:rPr lang="de-DE" sz="1600" dirty="0">
+                <a:latin typeface="+mj-lt"/>
+              </a:rPr>
+              <a:t>Large </a:t>
+            </a:r>
+            <a:r>
+              <a:rPr lang="de-DE" sz="1600" dirty="0" err="1">
+                <a:latin typeface="+mj-lt"/>
+              </a:rPr>
+              <a:t>deviations</a:t>
+            </a:r>
+            <a:r>
+              <a:rPr lang="de-DE" sz="1600" dirty="0">
+                <a:latin typeface="+mj-lt"/>
+              </a:rPr>
+              <a:t> in </a:t>
+            </a:r>
+            <a:r>
+              <a:rPr lang="de-DE" sz="1600" dirty="0" err="1">
+                <a:latin typeface="+mj-lt"/>
+              </a:rPr>
+              <a:t>the</a:t>
+            </a:r>
+            <a:r>
+              <a:rPr lang="de-DE" sz="1600" dirty="0">
+                <a:latin typeface="+mj-lt"/>
+              </a:rPr>
+              <a:t> </a:t>
+            </a:r>
+            <a:r>
+              <a:rPr lang="de-DE" sz="1600" dirty="0" err="1">
+                <a:latin typeface="+mj-lt"/>
+              </a:rPr>
+              <a:t>prediction</a:t>
+            </a:r>
+            <a:r>
+              <a:rPr lang="de-DE" sz="1600" dirty="0">
+                <a:latin typeface="+mj-lt"/>
+              </a:rPr>
+              <a:t> </a:t>
+            </a:r>
+            <a:r>
+              <a:rPr lang="de-DE" sz="1600" dirty="0" err="1">
+                <a:latin typeface="+mj-lt"/>
+              </a:rPr>
+              <a:t>of</a:t>
+            </a:r>
+            <a:r>
+              <a:rPr lang="de-DE" sz="1600" dirty="0">
+                <a:latin typeface="+mj-lt"/>
+              </a:rPr>
+              <a:t> </a:t>
+            </a:r>
+            <a:r>
+              <a:rPr lang="de-DE" sz="1600" dirty="0" err="1">
+                <a:latin typeface="+mj-lt"/>
+              </a:rPr>
+              <a:t>bankruptcy</a:t>
+            </a:r>
+            <a:r>
+              <a:rPr lang="de-DE" sz="1600" dirty="0">
+                <a:latin typeface="+mj-lt"/>
+              </a:rPr>
+              <a:t> </a:t>
+            </a:r>
+            <a:r>
+              <a:rPr lang="de-DE" sz="1600" dirty="0" err="1">
+                <a:latin typeface="+mj-lt"/>
+              </a:rPr>
+              <a:t>causes</a:t>
+            </a:r>
+            <a:r>
+              <a:rPr lang="de-DE" sz="1600" dirty="0">
+                <a:latin typeface="+mj-lt"/>
+              </a:rPr>
+              <a:t> </a:t>
+            </a:r>
+            <a:r>
+              <a:rPr lang="de-DE" sz="1600" dirty="0" err="1">
+                <a:latin typeface="+mj-lt"/>
+              </a:rPr>
+              <a:t>several</a:t>
+            </a:r>
+            <a:r>
+              <a:rPr lang="de-DE" sz="1600" dirty="0">
+                <a:latin typeface="+mj-lt"/>
+              </a:rPr>
+              <a:t> negative </a:t>
+            </a:r>
+            <a:r>
+              <a:rPr lang="de-DE" sz="1600" dirty="0" err="1">
+                <a:latin typeface="+mj-lt"/>
+              </a:rPr>
+              <a:t>cost</a:t>
+            </a:r>
+            <a:r>
+              <a:rPr lang="de-DE" sz="1600" dirty="0">
+                <a:latin typeface="+mj-lt"/>
+              </a:rPr>
+              <a:t> and </a:t>
+            </a:r>
+            <a:r>
+              <a:rPr lang="de-DE" sz="1600" dirty="0" err="1">
+                <a:latin typeface="+mj-lt"/>
+              </a:rPr>
+              <a:t>sales</a:t>
+            </a:r>
+            <a:r>
+              <a:rPr lang="de-DE" sz="1600" dirty="0">
+                <a:latin typeface="+mj-lt"/>
+              </a:rPr>
+              <a:t> </a:t>
+            </a:r>
+            <a:r>
+              <a:rPr lang="de-DE" sz="1600" dirty="0" err="1">
+                <a:latin typeface="+mj-lt"/>
+              </a:rPr>
+              <a:t>effects</a:t>
+            </a:r>
+            <a:r>
+              <a:rPr lang="de-DE" sz="1600" dirty="0">
+                <a:latin typeface="+mj-lt"/>
+              </a:rPr>
+              <a:t>. </a:t>
+            </a:r>
+          </a:p>
+        </p:txBody>
+      </p:sp>
+      <p:sp>
+        <p:nvSpPr>
+          <p:cNvPr id="17" name="Textfeld 16">
+            <a:extLst>
+              <a:ext uri="{FF2B5EF4-FFF2-40B4-BE49-F238E27FC236}">
+                <a16:creationId xmlns:a16="http://schemas.microsoft.com/office/drawing/2014/main" id="{8A82BF86-8633-4B0A-A6A6-096E37C0C914}"/>
+              </a:ext>
+            </a:extLst>
+          </p:cNvPr>
+          <p:cNvSpPr txBox="1"/>
+          <p:nvPr/>
+        </p:nvSpPr>
+        <p:spPr>
+          <a:xfrm>
+            <a:off x="1543377" y="1823411"/>
+            <a:ext cx="4085438" cy="584775"/>
+          </a:xfrm>
+          <a:prstGeom prst="rect">
+            <a:avLst/>
+          </a:prstGeom>
+          <a:noFill/>
+        </p:spPr>
+        <p:txBody>
+          <a:bodyPr wrap="square" rtlCol="0">
+            <a:spAutoFit/>
+          </a:bodyPr>
+          <a:lstStyle/>
+          <a:p>
+            <a:r>
+              <a:rPr lang="de-DE" sz="1600" dirty="0">
+                <a:latin typeface="+mj-lt"/>
+              </a:rPr>
+              <a:t>Not </a:t>
+            </a:r>
+            <a:r>
+              <a:rPr lang="de-DE" sz="1600" dirty="0" err="1">
+                <a:latin typeface="+mj-lt"/>
+              </a:rPr>
+              <a:t>identified</a:t>
+            </a:r>
+            <a:r>
+              <a:rPr lang="de-DE" sz="1600" dirty="0">
+                <a:latin typeface="+mj-lt"/>
+              </a:rPr>
+              <a:t> </a:t>
+            </a:r>
+            <a:r>
+              <a:rPr lang="de-DE" sz="1600" dirty="0" err="1">
+                <a:latin typeface="+mj-lt"/>
+              </a:rPr>
+              <a:t>insolvencies</a:t>
+            </a:r>
+            <a:r>
+              <a:rPr lang="de-DE" sz="1600" dirty="0">
+                <a:latin typeface="+mj-lt"/>
+              </a:rPr>
+              <a:t> </a:t>
+            </a:r>
+            <a:r>
+              <a:rPr lang="de-DE" sz="1600" dirty="0" err="1">
+                <a:latin typeface="+mj-lt"/>
+              </a:rPr>
+              <a:t>lead</a:t>
+            </a:r>
+            <a:r>
+              <a:rPr lang="de-DE" sz="1600" dirty="0">
+                <a:latin typeface="+mj-lt"/>
+              </a:rPr>
+              <a:t> </a:t>
+            </a:r>
+            <a:r>
+              <a:rPr lang="de-DE" sz="1600" dirty="0" err="1">
+                <a:latin typeface="+mj-lt"/>
+              </a:rPr>
+              <a:t>to</a:t>
+            </a:r>
+            <a:r>
+              <a:rPr lang="de-DE" sz="1600" dirty="0">
+                <a:latin typeface="+mj-lt"/>
+              </a:rPr>
+              <a:t> a </a:t>
+            </a:r>
+            <a:r>
+              <a:rPr lang="de-DE" sz="1600" dirty="0" err="1">
+                <a:latin typeface="+mj-lt"/>
+              </a:rPr>
+              <a:t>higher</a:t>
+            </a:r>
+            <a:r>
+              <a:rPr lang="de-DE" sz="1600" dirty="0">
+                <a:latin typeface="+mj-lt"/>
+              </a:rPr>
+              <a:t> rate </a:t>
+            </a:r>
+            <a:r>
+              <a:rPr lang="de-DE" sz="1600" dirty="0" err="1">
+                <a:latin typeface="+mj-lt"/>
+              </a:rPr>
+              <a:t>of</a:t>
+            </a:r>
+            <a:r>
+              <a:rPr lang="de-DE" sz="1600" dirty="0">
+                <a:latin typeface="+mj-lt"/>
+              </a:rPr>
+              <a:t> </a:t>
+            </a:r>
+            <a:r>
+              <a:rPr lang="de-DE" sz="1600" dirty="0" err="1">
+                <a:latin typeface="+mj-lt"/>
+              </a:rPr>
+              <a:t>compensations</a:t>
+            </a:r>
+            <a:r>
+              <a:rPr lang="de-DE" sz="1600" dirty="0">
+                <a:latin typeface="+mj-lt"/>
+              </a:rPr>
+              <a:t> </a:t>
+            </a:r>
+            <a:r>
+              <a:rPr lang="de-DE" sz="1600" dirty="0" err="1">
+                <a:latin typeface="+mj-lt"/>
+              </a:rPr>
+              <a:t>than</a:t>
+            </a:r>
+            <a:r>
+              <a:rPr lang="de-DE" sz="1600" dirty="0">
+                <a:latin typeface="+mj-lt"/>
+              </a:rPr>
+              <a:t> </a:t>
+            </a:r>
+            <a:r>
+              <a:rPr lang="de-DE" sz="1600" dirty="0" err="1">
+                <a:latin typeface="+mj-lt"/>
+              </a:rPr>
+              <a:t>planned</a:t>
+            </a:r>
+            <a:endParaRPr lang="de-DE" sz="1600" dirty="0">
+              <a:latin typeface="+mj-lt"/>
+            </a:endParaRPr>
+          </a:p>
+        </p:txBody>
+      </p:sp>
+      <p:sp>
+        <p:nvSpPr>
+          <p:cNvPr id="19" name="Textfeld 18">
+            <a:extLst>
+              <a:ext uri="{FF2B5EF4-FFF2-40B4-BE49-F238E27FC236}">
+                <a16:creationId xmlns:a16="http://schemas.microsoft.com/office/drawing/2014/main" id="{5BB5A865-A6A1-4DBC-8C6E-6279E0FEFB37}"/>
+              </a:ext>
+            </a:extLst>
+          </p:cNvPr>
+          <p:cNvSpPr txBox="1"/>
+          <p:nvPr/>
+        </p:nvSpPr>
+        <p:spPr>
+          <a:xfrm>
+            <a:off x="1543377" y="2603492"/>
+            <a:ext cx="4085438" cy="830997"/>
+          </a:xfrm>
+          <a:prstGeom prst="rect">
+            <a:avLst/>
+          </a:prstGeom>
+          <a:noFill/>
+        </p:spPr>
+        <p:txBody>
+          <a:bodyPr wrap="square" rtlCol="0">
+            <a:spAutoFit/>
+          </a:bodyPr>
+          <a:lstStyle/>
+          <a:p>
+            <a:r>
+              <a:rPr lang="de-DE" sz="1600" dirty="0" err="1">
+                <a:latin typeface="+mj-lt"/>
+              </a:rPr>
+              <a:t>Wrongly</a:t>
+            </a:r>
+            <a:r>
+              <a:rPr lang="de-DE" sz="1600" dirty="0">
+                <a:latin typeface="+mj-lt"/>
+              </a:rPr>
+              <a:t> </a:t>
+            </a:r>
+            <a:r>
+              <a:rPr lang="de-DE" sz="1600" dirty="0" err="1">
+                <a:latin typeface="+mj-lt"/>
+              </a:rPr>
+              <a:t>identified</a:t>
+            </a:r>
+            <a:r>
+              <a:rPr lang="de-DE" sz="1600" dirty="0">
+                <a:latin typeface="+mj-lt"/>
+              </a:rPr>
+              <a:t> </a:t>
+            </a:r>
+            <a:r>
+              <a:rPr lang="de-DE" sz="1600" dirty="0" err="1">
+                <a:latin typeface="+mj-lt"/>
+              </a:rPr>
+              <a:t>bankruptcies</a:t>
+            </a:r>
+            <a:r>
+              <a:rPr lang="de-DE" sz="1600" dirty="0">
+                <a:latin typeface="+mj-lt"/>
+              </a:rPr>
+              <a:t> </a:t>
+            </a:r>
+            <a:r>
+              <a:rPr lang="de-DE" sz="1600" dirty="0" err="1">
+                <a:latin typeface="+mj-lt"/>
+              </a:rPr>
+              <a:t>cause</a:t>
+            </a:r>
+            <a:r>
+              <a:rPr lang="de-DE" sz="1600" dirty="0">
+                <a:latin typeface="+mj-lt"/>
+              </a:rPr>
+              <a:t> </a:t>
+            </a:r>
+            <a:r>
+              <a:rPr lang="de-DE" sz="1600" dirty="0" err="1">
+                <a:latin typeface="+mj-lt"/>
+              </a:rPr>
+              <a:t>higher</a:t>
+            </a:r>
+            <a:r>
+              <a:rPr lang="de-DE" sz="1600" dirty="0">
+                <a:latin typeface="+mj-lt"/>
+              </a:rPr>
+              <a:t> </a:t>
+            </a:r>
+            <a:r>
+              <a:rPr lang="de-DE" sz="1600" dirty="0" err="1">
+                <a:latin typeface="+mj-lt"/>
+              </a:rPr>
+              <a:t>insurance</a:t>
+            </a:r>
+            <a:r>
+              <a:rPr lang="de-DE" sz="1600" dirty="0">
+                <a:latin typeface="+mj-lt"/>
+              </a:rPr>
+              <a:t> </a:t>
+            </a:r>
+            <a:r>
+              <a:rPr lang="de-DE" sz="1600" dirty="0" err="1">
+                <a:latin typeface="+mj-lt"/>
+              </a:rPr>
+              <a:t>premiums</a:t>
+            </a:r>
+            <a:r>
+              <a:rPr lang="de-DE" sz="1600" dirty="0">
+                <a:latin typeface="+mj-lt"/>
+              </a:rPr>
+              <a:t> </a:t>
+            </a:r>
+            <a:r>
+              <a:rPr lang="de-DE" sz="1600" dirty="0" err="1">
+                <a:latin typeface="+mj-lt"/>
+              </a:rPr>
+              <a:t>which</a:t>
+            </a:r>
+            <a:r>
+              <a:rPr lang="de-DE" sz="1600" dirty="0">
+                <a:latin typeface="+mj-lt"/>
+              </a:rPr>
+              <a:t> </a:t>
+            </a:r>
+            <a:r>
+              <a:rPr lang="de-DE" sz="1600" dirty="0" err="1">
+                <a:latin typeface="+mj-lt"/>
+              </a:rPr>
+              <a:t>may</a:t>
+            </a:r>
+            <a:r>
+              <a:rPr lang="de-DE" sz="1600" dirty="0">
+                <a:latin typeface="+mj-lt"/>
+              </a:rPr>
+              <a:t> </a:t>
+            </a:r>
+            <a:r>
+              <a:rPr lang="de-DE" sz="1600" dirty="0" err="1">
+                <a:latin typeface="+mj-lt"/>
+              </a:rPr>
+              <a:t>lead</a:t>
+            </a:r>
+            <a:r>
+              <a:rPr lang="de-DE" sz="1600" dirty="0">
+                <a:latin typeface="+mj-lt"/>
+              </a:rPr>
+              <a:t> </a:t>
+            </a:r>
+            <a:r>
+              <a:rPr lang="de-DE" sz="1600" dirty="0" err="1">
+                <a:latin typeface="+mj-lt"/>
+              </a:rPr>
+              <a:t>to</a:t>
+            </a:r>
+            <a:r>
+              <a:rPr lang="de-DE" sz="1600" dirty="0">
+                <a:latin typeface="+mj-lt"/>
+              </a:rPr>
+              <a:t> </a:t>
+            </a:r>
+            <a:r>
+              <a:rPr lang="de-DE" sz="1600" dirty="0" err="1">
+                <a:latin typeface="+mj-lt"/>
+              </a:rPr>
+              <a:t>higher</a:t>
+            </a:r>
+            <a:r>
+              <a:rPr lang="de-DE" sz="1600" dirty="0">
+                <a:latin typeface="+mj-lt"/>
+              </a:rPr>
+              <a:t> </a:t>
+            </a:r>
+            <a:r>
+              <a:rPr lang="de-DE" sz="1600" dirty="0" err="1">
+                <a:latin typeface="+mj-lt"/>
+              </a:rPr>
+              <a:t>contract</a:t>
+            </a:r>
+            <a:r>
+              <a:rPr lang="de-DE" sz="1600" dirty="0">
+                <a:latin typeface="+mj-lt"/>
+              </a:rPr>
+              <a:t> </a:t>
+            </a:r>
+            <a:r>
+              <a:rPr lang="de-DE" sz="1600" dirty="0" err="1">
+                <a:latin typeface="+mj-lt"/>
+              </a:rPr>
+              <a:t>terminations</a:t>
+            </a:r>
+            <a:endParaRPr lang="de-DE" sz="1600" dirty="0">
+              <a:latin typeface="+mj-lt"/>
+            </a:endParaRPr>
+          </a:p>
+        </p:txBody>
+      </p:sp>
+      <p:sp>
+        <p:nvSpPr>
+          <p:cNvPr id="21" name="Textfeld 20">
+            <a:extLst>
+              <a:ext uri="{FF2B5EF4-FFF2-40B4-BE49-F238E27FC236}">
+                <a16:creationId xmlns:a16="http://schemas.microsoft.com/office/drawing/2014/main" id="{8B773AF4-C556-4F63-8029-588E82DE2B6B}"/>
+              </a:ext>
+            </a:extLst>
+          </p:cNvPr>
+          <p:cNvSpPr txBox="1"/>
+          <p:nvPr/>
+        </p:nvSpPr>
+        <p:spPr>
+          <a:xfrm>
+            <a:off x="1543377" y="3660572"/>
+            <a:ext cx="4085438" cy="830997"/>
+          </a:xfrm>
+          <a:prstGeom prst="rect">
+            <a:avLst/>
+          </a:prstGeom>
+          <a:noFill/>
+        </p:spPr>
+        <p:txBody>
+          <a:bodyPr wrap="square" rtlCol="0">
+            <a:spAutoFit/>
+          </a:bodyPr>
+          <a:lstStyle/>
+          <a:p>
+            <a:r>
+              <a:rPr lang="de-DE" sz="1600" dirty="0" err="1">
+                <a:latin typeface="+mj-lt"/>
+              </a:rPr>
+              <a:t>Un</a:t>
+            </a:r>
+            <a:r>
+              <a:rPr lang="de-DE" sz="1600" dirty="0">
+                <a:latin typeface="+mj-lt"/>
+              </a:rPr>
+              <a:t>- </a:t>
+            </a:r>
+            <a:r>
+              <a:rPr lang="de-DE" sz="1600" dirty="0" err="1">
+                <a:latin typeface="+mj-lt"/>
+              </a:rPr>
+              <a:t>or</a:t>
+            </a:r>
+            <a:r>
+              <a:rPr lang="de-DE" sz="1600" dirty="0">
+                <a:latin typeface="+mj-lt"/>
+              </a:rPr>
+              <a:t> </a:t>
+            </a:r>
+            <a:r>
+              <a:rPr lang="de-DE" sz="1600" dirty="0" err="1">
+                <a:latin typeface="+mj-lt"/>
+              </a:rPr>
+              <a:t>bad</a:t>
+            </a:r>
+            <a:r>
+              <a:rPr lang="de-DE" sz="1600" dirty="0">
+                <a:latin typeface="+mj-lt"/>
+              </a:rPr>
+              <a:t> </a:t>
+            </a:r>
+            <a:r>
+              <a:rPr lang="de-DE" sz="1600" dirty="0" err="1">
+                <a:latin typeface="+mj-lt"/>
+              </a:rPr>
+              <a:t>estimated</a:t>
+            </a:r>
+            <a:r>
+              <a:rPr lang="de-DE" sz="1600" dirty="0">
+                <a:latin typeface="+mj-lt"/>
+              </a:rPr>
+              <a:t> </a:t>
+            </a:r>
+            <a:r>
+              <a:rPr lang="de-DE" sz="1600" dirty="0" err="1">
+                <a:latin typeface="+mj-lt"/>
+              </a:rPr>
+              <a:t>insolvency</a:t>
+            </a:r>
+            <a:r>
+              <a:rPr lang="de-DE" sz="1600" dirty="0">
+                <a:latin typeface="+mj-lt"/>
+              </a:rPr>
+              <a:t> </a:t>
+            </a:r>
+            <a:r>
+              <a:rPr lang="de-DE" sz="1600" dirty="0" err="1">
+                <a:latin typeface="+mj-lt"/>
+              </a:rPr>
+              <a:t>rates</a:t>
+            </a:r>
+            <a:r>
+              <a:rPr lang="de-DE" sz="1600" dirty="0">
+                <a:latin typeface="+mj-lt"/>
+              </a:rPr>
+              <a:t> </a:t>
+            </a:r>
+            <a:r>
+              <a:rPr lang="de-DE" sz="1600" dirty="0" err="1">
+                <a:latin typeface="+mj-lt"/>
+              </a:rPr>
+              <a:t>require</a:t>
+            </a:r>
+            <a:r>
+              <a:rPr lang="de-DE" sz="1600" dirty="0">
+                <a:latin typeface="+mj-lt"/>
+              </a:rPr>
+              <a:t> </a:t>
+            </a:r>
+            <a:r>
+              <a:rPr lang="de-DE" sz="1600" dirty="0" err="1">
+                <a:latin typeface="+mj-lt"/>
+              </a:rPr>
+              <a:t>higher</a:t>
+            </a:r>
+            <a:r>
+              <a:rPr lang="de-DE" sz="1600" dirty="0">
+                <a:latin typeface="+mj-lt"/>
+              </a:rPr>
+              <a:t> </a:t>
+            </a:r>
+            <a:r>
+              <a:rPr lang="de-DE" sz="1600" dirty="0" err="1">
+                <a:latin typeface="+mj-lt"/>
+              </a:rPr>
+              <a:t>equity</a:t>
+            </a:r>
+            <a:r>
+              <a:rPr lang="de-DE" sz="1600" dirty="0">
+                <a:latin typeface="+mj-lt"/>
+              </a:rPr>
+              <a:t> </a:t>
+            </a:r>
+            <a:r>
+              <a:rPr lang="de-DE" sz="1600" dirty="0" err="1">
+                <a:latin typeface="+mj-lt"/>
+              </a:rPr>
+              <a:t>shares</a:t>
+            </a:r>
+            <a:r>
+              <a:rPr lang="de-DE" sz="1600" dirty="0">
+                <a:latin typeface="+mj-lt"/>
+              </a:rPr>
+              <a:t>. </a:t>
+            </a:r>
+            <a:r>
+              <a:rPr lang="de-DE" sz="1600" dirty="0" err="1">
+                <a:latin typeface="+mj-lt"/>
+              </a:rPr>
+              <a:t>Therefore</a:t>
+            </a:r>
+            <a:r>
+              <a:rPr lang="de-DE" sz="1600" dirty="0">
+                <a:latin typeface="+mj-lt"/>
+              </a:rPr>
+              <a:t> </a:t>
+            </a:r>
+            <a:r>
+              <a:rPr lang="de-DE" sz="1600" dirty="0" err="1">
+                <a:latin typeface="+mj-lt"/>
+              </a:rPr>
+              <a:t>minimize</a:t>
+            </a:r>
+            <a:r>
+              <a:rPr lang="de-DE" sz="1600" dirty="0">
+                <a:latin typeface="+mj-lt"/>
+              </a:rPr>
+              <a:t> </a:t>
+            </a:r>
+            <a:r>
+              <a:rPr lang="de-DE" sz="1600" dirty="0" err="1">
+                <a:latin typeface="+mj-lt"/>
+              </a:rPr>
+              <a:t>the</a:t>
+            </a:r>
+            <a:r>
+              <a:rPr lang="de-DE" sz="1600" dirty="0">
+                <a:latin typeface="+mj-lt"/>
+              </a:rPr>
+              <a:t> </a:t>
+            </a:r>
+            <a:r>
+              <a:rPr lang="de-DE" sz="1600" dirty="0" err="1">
+                <a:latin typeface="+mj-lt"/>
+              </a:rPr>
+              <a:t>ability</a:t>
+            </a:r>
+            <a:r>
+              <a:rPr lang="de-DE" sz="1600" dirty="0">
+                <a:latin typeface="+mj-lt"/>
+              </a:rPr>
+              <a:t> </a:t>
+            </a:r>
+            <a:r>
+              <a:rPr lang="de-DE" sz="1600" dirty="0" err="1">
+                <a:latin typeface="+mj-lt"/>
+              </a:rPr>
+              <a:t>to</a:t>
+            </a:r>
+            <a:r>
+              <a:rPr lang="de-DE" sz="1600" dirty="0">
+                <a:latin typeface="+mj-lt"/>
+              </a:rPr>
+              <a:t> </a:t>
+            </a:r>
+            <a:r>
+              <a:rPr lang="de-DE" sz="1600" dirty="0" err="1">
+                <a:latin typeface="+mj-lt"/>
+              </a:rPr>
+              <a:t>leverage</a:t>
+            </a:r>
+            <a:r>
+              <a:rPr lang="de-DE" sz="1600" dirty="0">
+                <a:latin typeface="+mj-lt"/>
+              </a:rPr>
+              <a:t> </a:t>
+            </a:r>
+            <a:r>
+              <a:rPr lang="de-DE" sz="1600" dirty="0" err="1">
+                <a:latin typeface="+mj-lt"/>
+              </a:rPr>
+              <a:t>the</a:t>
+            </a:r>
+            <a:r>
+              <a:rPr lang="de-DE" sz="1600" dirty="0">
+                <a:latin typeface="+mj-lt"/>
+              </a:rPr>
+              <a:t> </a:t>
+            </a:r>
+            <a:r>
+              <a:rPr lang="de-DE" sz="1600" dirty="0" err="1">
+                <a:latin typeface="+mj-lt"/>
+              </a:rPr>
+              <a:t>available</a:t>
+            </a:r>
+            <a:r>
+              <a:rPr lang="de-DE" sz="1600" dirty="0">
+                <a:latin typeface="+mj-lt"/>
+              </a:rPr>
+              <a:t> </a:t>
+            </a:r>
+            <a:r>
+              <a:rPr lang="de-DE" sz="1600" dirty="0" err="1">
+                <a:latin typeface="+mj-lt"/>
+              </a:rPr>
+              <a:t>capital</a:t>
+            </a:r>
+            <a:r>
+              <a:rPr lang="de-DE" sz="1600" dirty="0">
+                <a:latin typeface="+mj-lt"/>
+              </a:rPr>
+              <a:t>. </a:t>
+            </a:r>
+          </a:p>
+        </p:txBody>
+      </p:sp>
+      <p:cxnSp>
+        <p:nvCxnSpPr>
+          <p:cNvPr id="24" name="Gerader Verbinder 23">
+            <a:extLst>
+              <a:ext uri="{FF2B5EF4-FFF2-40B4-BE49-F238E27FC236}">
+                <a16:creationId xmlns:a16="http://schemas.microsoft.com/office/drawing/2014/main" id="{15FC6B6D-05BF-4D27-948C-11AE372750AC}"/>
+              </a:ext>
+            </a:extLst>
+          </p:cNvPr>
+          <p:cNvCxnSpPr>
+            <a:cxnSpLocks/>
+          </p:cNvCxnSpPr>
+          <p:nvPr/>
+        </p:nvCxnSpPr>
+        <p:spPr>
+          <a:xfrm flipV="1">
+            <a:off x="906651" y="1708689"/>
+            <a:ext cx="4641742" cy="20995"/>
+          </a:xfrm>
+          <a:prstGeom prst="line">
+            <a:avLst/>
+          </a:prstGeom>
+        </p:spPr>
+        <p:style>
+          <a:lnRef idx="1">
+            <a:schemeClr val="dk1"/>
+          </a:lnRef>
+          <a:fillRef idx="0">
+            <a:schemeClr val="dk1"/>
+          </a:fillRef>
+          <a:effectRef idx="0">
+            <a:schemeClr val="dk1"/>
+          </a:effectRef>
+          <a:fontRef idx="minor">
+            <a:schemeClr val="tx1"/>
+          </a:fontRef>
+        </p:style>
+      </p:cxnSp>
+      <p:pic>
+        <p:nvPicPr>
+          <p:cNvPr id="27" name="Grafik 26">
+            <a:extLst>
+              <a:ext uri="{FF2B5EF4-FFF2-40B4-BE49-F238E27FC236}">
+                <a16:creationId xmlns:a16="http://schemas.microsoft.com/office/drawing/2014/main" id="{FA95D1C1-0A79-4E5F-B60B-BC7857D127E8}"/>
+              </a:ext>
+            </a:extLst>
+          </p:cNvPr>
+          <p:cNvPicPr>
+            <a:picLocks noChangeAspect="1"/>
+          </p:cNvPicPr>
+          <p:nvPr/>
+        </p:nvPicPr>
+        <p:blipFill>
+          <a:blip r:embed="rId2">
+            <a:extLst>
+              <a:ext uri="{28A0092B-C50C-407E-A947-70E740481C1C}">
+                <a14:useLocalDpi xmlns:a14="http://schemas.microsoft.com/office/drawing/2010/main" val="0"/>
+              </a:ext>
+            </a:extLst>
+          </a:blip>
+          <a:stretch>
+            <a:fillRect/>
+          </a:stretch>
+        </p:blipFill>
+        <p:spPr>
+          <a:xfrm>
+            <a:off x="789122" y="1700774"/>
+            <a:ext cx="847241" cy="847241"/>
           </a:xfrm>
           <a:prstGeom prst="rect">
             <a:avLst/>
           </a:prstGeom>
         </p:spPr>
-        <p:txBody>
-          <a:bodyPr vert="horz" lIns="91440" tIns="45720" rIns="91440" bIns="45720" rtlCol="0">
-            <a:normAutofit fontScale="47500" lnSpcReduction="20000"/>
-          </a:bodyPr>
-          <a:lstStyle>
-            <a:lvl1pPr marL="228600" indent="-228600" algn="l" defTabSz="914400" rtl="0" eaLnBrk="1" latinLnBrk="0" hangingPunct="1">
-              <a:lnSpc>
-                <a:spcPct val="90000"/>
-              </a:lnSpc>
-              <a:spcBef>
-                <a:spcPts val="1000"/>
-              </a:spcBef>
-              <a:buFont typeface="Arial" panose="020B0604020202020204" pitchFamily="34" charset="0"/>
-              <a:buChar char="•"/>
-              <a:defRPr sz="2800" kern="1200">
-                <a:solidFill>
-                  <a:schemeClr val="tx1"/>
-                </a:solidFill>
-                <a:latin typeface="+mn-lt"/>
-                <a:ea typeface="+mn-ea"/>
-                <a:cs typeface="+mn-cs"/>
-              </a:defRPr>
-            </a:lvl1pPr>
-            <a:lvl2pPr marL="685800" indent="-228600" algn="l" defTabSz="914400" rtl="0" eaLnBrk="1" latinLnBrk="0" hangingPunct="1">
-              <a:lnSpc>
-                <a:spcPct val="90000"/>
-              </a:lnSpc>
-              <a:spcBef>
-                <a:spcPts val="500"/>
-              </a:spcBef>
-              <a:buFont typeface="Arial" panose="020B0604020202020204" pitchFamily="34" charset="0"/>
-              <a:buChar char="•"/>
-              <a:defRPr sz="2400" kern="1200">
-                <a:solidFill>
-                  <a:schemeClr val="tx1"/>
-                </a:solidFill>
-                <a:latin typeface="+mn-lt"/>
-                <a:ea typeface="+mn-ea"/>
-                <a:cs typeface="+mn-cs"/>
-              </a:defRPr>
-            </a:lvl2pPr>
-            <a:lvl3pPr marL="1143000" indent="-228600" algn="l" defTabSz="914400" rtl="0" eaLnBrk="1" latinLnBrk="0" hangingPunct="1">
-              <a:lnSpc>
-                <a:spcPct val="90000"/>
-              </a:lnSpc>
-              <a:spcBef>
-                <a:spcPts val="500"/>
-              </a:spcBef>
-              <a:buFont typeface="Arial" panose="020B0604020202020204" pitchFamily="34" charset="0"/>
-              <a:buChar char="•"/>
-              <a:defRPr sz="2000" kern="1200">
-                <a:solidFill>
-                  <a:schemeClr val="tx1"/>
-                </a:solidFill>
-                <a:latin typeface="+mn-lt"/>
-                <a:ea typeface="+mn-ea"/>
-                <a:cs typeface="+mn-cs"/>
-              </a:defRPr>
-            </a:lvl3pPr>
-            <a:lvl4pPr marL="1600200" indent="-228600" algn="l" defTabSz="914400" rtl="0" eaLnBrk="1" latinLnBrk="0" hangingPunct="1">
-              <a:lnSpc>
-                <a:spcPct val="90000"/>
-              </a:lnSpc>
-              <a:spcBef>
-                <a:spcPts val="500"/>
-              </a:spcBef>
-              <a:buFont typeface="Arial" panose="020B0604020202020204" pitchFamily="34" charset="0"/>
-              <a:buChar char="•"/>
-              <a:defRPr sz="1800" kern="1200">
-                <a:solidFill>
-                  <a:schemeClr val="tx1"/>
-                </a:solidFill>
-                <a:latin typeface="+mn-lt"/>
-                <a:ea typeface="+mn-ea"/>
-                <a:cs typeface="+mn-cs"/>
-              </a:defRPr>
-            </a:lvl4pPr>
-            <a:lvl5pPr marL="2057400" indent="-228600" algn="l" defTabSz="914400" rtl="0" eaLnBrk="1" latinLnBrk="0" hangingPunct="1">
-              <a:lnSpc>
-                <a:spcPct val="90000"/>
-              </a:lnSpc>
-              <a:spcBef>
-                <a:spcPts val="500"/>
-              </a:spcBef>
-              <a:buFont typeface="Arial" panose="020B0604020202020204" pitchFamily="34" charset="0"/>
-              <a:buChar char="•"/>
-              <a:defRPr sz="1800" kern="1200">
-                <a:solidFill>
-                  <a:schemeClr val="tx1"/>
-                </a:solidFill>
-                <a:latin typeface="+mn-lt"/>
-                <a:ea typeface="+mn-ea"/>
-                <a:cs typeface="+mn-cs"/>
-              </a:defRPr>
-            </a:lvl5pPr>
-            <a:lvl6pPr marL="2514600" indent="-228600" algn="l" defTabSz="914400" rtl="0" eaLnBrk="1" latinLnBrk="0" hangingPunct="1">
-              <a:lnSpc>
-                <a:spcPct val="90000"/>
-              </a:lnSpc>
-              <a:spcBef>
-                <a:spcPts val="500"/>
-              </a:spcBef>
-              <a:buFont typeface="Arial" panose="020B0604020202020204" pitchFamily="34" charset="0"/>
-              <a:buChar char="•"/>
-              <a:defRPr sz="1800" kern="1200">
-                <a:solidFill>
-                  <a:schemeClr val="tx1"/>
-                </a:solidFill>
-                <a:latin typeface="+mn-lt"/>
-                <a:ea typeface="+mn-ea"/>
-                <a:cs typeface="+mn-cs"/>
-              </a:defRPr>
-            </a:lvl6pPr>
-            <a:lvl7pPr marL="2971800" indent="-228600" algn="l" defTabSz="914400" rtl="0" eaLnBrk="1" latinLnBrk="0" hangingPunct="1">
-              <a:lnSpc>
-                <a:spcPct val="90000"/>
-              </a:lnSpc>
-              <a:spcBef>
-                <a:spcPts val="500"/>
-              </a:spcBef>
-              <a:buFont typeface="Arial" panose="020B0604020202020204" pitchFamily="34" charset="0"/>
-              <a:buChar char="•"/>
-              <a:defRPr sz="1800" kern="1200">
-                <a:solidFill>
-                  <a:schemeClr val="tx1"/>
-                </a:solidFill>
-                <a:latin typeface="+mn-lt"/>
-                <a:ea typeface="+mn-ea"/>
-                <a:cs typeface="+mn-cs"/>
-              </a:defRPr>
-            </a:lvl7pPr>
-            <a:lvl8pPr marL="3429000" indent="-228600" algn="l" defTabSz="914400" rtl="0" eaLnBrk="1" latinLnBrk="0" hangingPunct="1">
-              <a:lnSpc>
-                <a:spcPct val="90000"/>
-              </a:lnSpc>
-              <a:spcBef>
-                <a:spcPts val="500"/>
-              </a:spcBef>
-              <a:buFont typeface="Arial" panose="020B0604020202020204" pitchFamily="34" charset="0"/>
-              <a:buChar char="•"/>
-              <a:defRPr sz="1800" kern="1200">
-                <a:solidFill>
-                  <a:schemeClr val="tx1"/>
-                </a:solidFill>
-                <a:latin typeface="+mn-lt"/>
-                <a:ea typeface="+mn-ea"/>
-                <a:cs typeface="+mn-cs"/>
-              </a:defRPr>
-            </a:lvl8pPr>
-            <a:lvl9pPr marL="3886200" indent="-228600" algn="l" defTabSz="914400" rtl="0" eaLnBrk="1" latinLnBrk="0" hangingPunct="1">
-              <a:lnSpc>
-                <a:spcPct val="90000"/>
-              </a:lnSpc>
-              <a:spcBef>
-                <a:spcPts val="500"/>
-              </a:spcBef>
-              <a:buFont typeface="Arial" panose="020B0604020202020204" pitchFamily="34" charset="0"/>
-              <a:buChar char="•"/>
-              <a:defRPr sz="1800" kern="1200">
-                <a:solidFill>
-                  <a:schemeClr val="tx1"/>
-                </a:solidFill>
-                <a:latin typeface="+mn-lt"/>
-                <a:ea typeface="+mn-ea"/>
-                <a:cs typeface="+mn-cs"/>
-              </a:defRPr>
-            </a:lvl9pPr>
-          </a:lstStyle>
-          <a:p>
-            <a:pPr marL="0" indent="0">
-              <a:buFont typeface="Arial" panose="020B0604020202020204" pitchFamily="34" charset="0"/>
-              <a:buNone/>
-            </a:pPr>
-            <a:r>
-              <a:rPr lang="de-DE" dirty="0"/>
-              <a:t>Hier die Anzahl der Observationen und Variablen darstellen</a:t>
-            </a:r>
-          </a:p>
-        </p:txBody>
-      </p:sp>
-      <p:sp>
-        <p:nvSpPr>
-          <p:cNvPr id="11" name="Inhaltsplatzhalter 4">
-            <a:extLst>
-              <a:ext uri="{FF2B5EF4-FFF2-40B4-BE49-F238E27FC236}">
-                <a16:creationId xmlns:a16="http://schemas.microsoft.com/office/drawing/2014/main" id="{9E63F699-ED11-4B90-BC29-E0D04CDC427D}"/>
-              </a:ext>
-            </a:extLst>
-          </p:cNvPr>
-          <p:cNvSpPr txBox="1">
-            <a:spLocks/>
-          </p:cNvSpPr>
+      </p:pic>
+      <p:pic>
+        <p:nvPicPr>
+          <p:cNvPr id="29" name="Grafik 28">
+            <a:extLst>
+              <a:ext uri="{FF2B5EF4-FFF2-40B4-BE49-F238E27FC236}">
+                <a16:creationId xmlns:a16="http://schemas.microsoft.com/office/drawing/2014/main" id="{F3062FFA-7E0F-415F-8F02-70BB19647400}"/>
+              </a:ext>
+            </a:extLst>
+          </p:cNvPr>
+          <p:cNvPicPr>
+            <a:picLocks noChangeAspect="1"/>
+          </p:cNvPicPr>
           <p:nvPr/>
-        </p:nvSpPr>
+        </p:nvPicPr>
+        <p:blipFill>
+          <a:blip r:embed="rId3">
+            <a:extLst>
+              <a:ext uri="{28A0092B-C50C-407E-A947-70E740481C1C}">
+                <a14:useLocalDpi xmlns:a14="http://schemas.microsoft.com/office/drawing/2010/main" val="0"/>
+              </a:ext>
+            </a:extLst>
+          </a:blip>
+          <a:stretch>
+            <a:fillRect/>
+          </a:stretch>
+        </p:blipFill>
         <p:spPr>
           <a:xfrm>
-            <a:off x="7040105" y="3291802"/>
-            <a:ext cx="4710193" cy="274395"/>
+            <a:off x="838200" y="2642019"/>
+            <a:ext cx="717945" cy="717945"/>
           </a:xfrm>
           <a:prstGeom prst="rect">
             <a:avLst/>
           </a:prstGeom>
         </p:spPr>
-        <p:txBody>
-          <a:bodyPr vert="horz" lIns="91440" tIns="45720" rIns="91440" bIns="45720" rtlCol="0">
-            <a:normAutofit fontScale="55000" lnSpcReduction="20000"/>
+      </p:pic>
+      <p:pic>
+        <p:nvPicPr>
+          <p:cNvPr id="31" name="Grafik 30">
+            <a:extLst>
+              <a:ext uri="{FF2B5EF4-FFF2-40B4-BE49-F238E27FC236}">
+                <a16:creationId xmlns:a16="http://schemas.microsoft.com/office/drawing/2014/main" id="{DAE3A797-8878-43BA-8557-A6366614B05C}"/>
+              </a:ext>
+            </a:extLst>
+          </p:cNvPr>
+          <p:cNvPicPr>
+            <a:picLocks noChangeAspect="1"/>
+          </p:cNvPicPr>
+          <p:nvPr/>
+        </p:nvPicPr>
+        <p:blipFill>
+          <a:blip r:embed="rId4">
+            <a:extLst>
+              <a:ext uri="{28A0092B-C50C-407E-A947-70E740481C1C}">
+                <a14:useLocalDpi xmlns:a14="http://schemas.microsoft.com/office/drawing/2010/main" val="0"/>
+              </a:ext>
+            </a:extLst>
+          </a:blip>
+          <a:stretch>
+            <a:fillRect/>
+          </a:stretch>
+        </p:blipFill>
+        <p:spPr>
+          <a:xfrm>
+            <a:off x="838199" y="3683710"/>
+            <a:ext cx="717945" cy="717945"/>
+          </a:xfrm>
+          <a:prstGeom prst="rect">
+            <a:avLst/>
+          </a:prstGeom>
+        </p:spPr>
+      </p:pic>
+      <p:pic>
+        <p:nvPicPr>
+          <p:cNvPr id="33" name="Grafik 32">
+            <a:extLst>
+              <a:ext uri="{FF2B5EF4-FFF2-40B4-BE49-F238E27FC236}">
+                <a16:creationId xmlns:a16="http://schemas.microsoft.com/office/drawing/2014/main" id="{3003D8A6-4C4C-4513-B8A2-0498C9B3FCD6}"/>
+              </a:ext>
+            </a:extLst>
+          </p:cNvPr>
+          <p:cNvPicPr>
+            <a:picLocks noChangeAspect="1"/>
+          </p:cNvPicPr>
+          <p:nvPr/>
+        </p:nvPicPr>
+        <p:blipFill>
+          <a:blip r:embed="rId5">
+            <a:extLst>
+              <a:ext uri="{28A0092B-C50C-407E-A947-70E740481C1C}">
+                <a14:useLocalDpi xmlns:a14="http://schemas.microsoft.com/office/drawing/2010/main" val="0"/>
+              </a:ext>
+            </a:extLst>
+          </a:blip>
+          <a:stretch>
+            <a:fillRect/>
+          </a:stretch>
+        </p:blipFill>
+        <p:spPr>
+          <a:xfrm>
+            <a:off x="694391" y="5331463"/>
+            <a:ext cx="1150358" cy="1150358"/>
+          </a:xfrm>
+          <a:prstGeom prst="rect">
+            <a:avLst/>
+          </a:prstGeom>
+        </p:spPr>
+      </p:pic>
+      <p:pic>
+        <p:nvPicPr>
+          <p:cNvPr id="37" name="Grafik 36">
+            <a:extLst>
+              <a:ext uri="{FF2B5EF4-FFF2-40B4-BE49-F238E27FC236}">
+                <a16:creationId xmlns:a16="http://schemas.microsoft.com/office/drawing/2014/main" id="{D50AC269-931E-4601-A340-0E17401BF646}"/>
+              </a:ext>
+            </a:extLst>
+          </p:cNvPr>
+          <p:cNvPicPr>
+            <a:picLocks noChangeAspect="1"/>
+          </p:cNvPicPr>
+          <p:nvPr/>
+        </p:nvPicPr>
+        <p:blipFill>
+          <a:blip r:embed="rId6">
+            <a:extLst>
+              <a:ext uri="{28A0092B-C50C-407E-A947-70E740481C1C}">
+                <a14:useLocalDpi xmlns:a14="http://schemas.microsoft.com/office/drawing/2010/main" val="0"/>
+              </a:ext>
+            </a:extLst>
+          </a:blip>
+          <a:stretch>
+            <a:fillRect/>
+          </a:stretch>
+        </p:blipFill>
+        <p:spPr>
+          <a:xfrm>
+            <a:off x="6028369" y="1247425"/>
+            <a:ext cx="5193224" cy="3338502"/>
+          </a:xfrm>
+          <a:prstGeom prst="rect">
+            <a:avLst/>
+          </a:prstGeom>
+        </p:spPr>
+      </p:pic>
+      <p:sp>
+        <p:nvSpPr>
+          <p:cNvPr id="42" name="Textfeld 41">
+            <a:extLst>
+              <a:ext uri="{FF2B5EF4-FFF2-40B4-BE49-F238E27FC236}">
+                <a16:creationId xmlns:a16="http://schemas.microsoft.com/office/drawing/2014/main" id="{D20795CA-C3D0-4B9D-AC99-F90D07E08009}"/>
+              </a:ext>
+            </a:extLst>
+          </p:cNvPr>
+          <p:cNvSpPr txBox="1"/>
+          <p:nvPr/>
+        </p:nvSpPr>
+        <p:spPr>
+          <a:xfrm>
+            <a:off x="6235659" y="1373656"/>
+            <a:ext cx="4710193" cy="400110"/>
+          </a:xfrm>
+          <a:prstGeom prst="rect">
+            <a:avLst/>
+          </a:prstGeom>
+          <a:noFill/>
+        </p:spPr>
+        <p:txBody>
+          <a:bodyPr wrap="square" rtlCol="0">
+            <a:spAutoFit/>
           </a:bodyPr>
-          <a:lstStyle>
-            <a:lvl1pPr marL="228600" indent="-228600" algn="l" defTabSz="914400" rtl="0" eaLnBrk="1" latinLnBrk="0" hangingPunct="1">
-              <a:lnSpc>
-                <a:spcPct val="90000"/>
-              </a:lnSpc>
-              <a:spcBef>
-                <a:spcPts val="1000"/>
-              </a:spcBef>
-              <a:buFont typeface="Arial" panose="020B0604020202020204" pitchFamily="34" charset="0"/>
-              <a:buChar char="•"/>
-              <a:defRPr sz="2800" kern="1200">
-                <a:solidFill>
-                  <a:schemeClr val="tx1"/>
-                </a:solidFill>
-                <a:latin typeface="+mn-lt"/>
-                <a:ea typeface="+mn-ea"/>
-                <a:cs typeface="+mn-cs"/>
-              </a:defRPr>
-            </a:lvl1pPr>
-            <a:lvl2pPr marL="685800" indent="-228600" algn="l" defTabSz="914400" rtl="0" eaLnBrk="1" latinLnBrk="0" hangingPunct="1">
-              <a:lnSpc>
-                <a:spcPct val="90000"/>
-              </a:lnSpc>
-              <a:spcBef>
-                <a:spcPts val="500"/>
-              </a:spcBef>
-              <a:buFont typeface="Arial" panose="020B0604020202020204" pitchFamily="34" charset="0"/>
-              <a:buChar char="•"/>
-              <a:defRPr sz="2400" kern="1200">
-                <a:solidFill>
-                  <a:schemeClr val="tx1"/>
-                </a:solidFill>
-                <a:latin typeface="+mn-lt"/>
-                <a:ea typeface="+mn-ea"/>
-                <a:cs typeface="+mn-cs"/>
-              </a:defRPr>
-            </a:lvl2pPr>
-            <a:lvl3pPr marL="1143000" indent="-228600" algn="l" defTabSz="914400" rtl="0" eaLnBrk="1" latinLnBrk="0" hangingPunct="1">
-              <a:lnSpc>
-                <a:spcPct val="90000"/>
-              </a:lnSpc>
-              <a:spcBef>
-                <a:spcPts val="500"/>
-              </a:spcBef>
-              <a:buFont typeface="Arial" panose="020B0604020202020204" pitchFamily="34" charset="0"/>
-              <a:buChar char="•"/>
-              <a:defRPr sz="2000" kern="1200">
-                <a:solidFill>
-                  <a:schemeClr val="tx1"/>
-                </a:solidFill>
-                <a:latin typeface="+mn-lt"/>
-                <a:ea typeface="+mn-ea"/>
-                <a:cs typeface="+mn-cs"/>
-              </a:defRPr>
-            </a:lvl3pPr>
-            <a:lvl4pPr marL="1600200" indent="-228600" algn="l" defTabSz="914400" rtl="0" eaLnBrk="1" latinLnBrk="0" hangingPunct="1">
-              <a:lnSpc>
-                <a:spcPct val="90000"/>
-              </a:lnSpc>
-              <a:spcBef>
-                <a:spcPts val="500"/>
-              </a:spcBef>
-              <a:buFont typeface="Arial" panose="020B0604020202020204" pitchFamily="34" charset="0"/>
-              <a:buChar char="•"/>
-              <a:defRPr sz="1800" kern="1200">
-                <a:solidFill>
-                  <a:schemeClr val="tx1"/>
-                </a:solidFill>
-                <a:latin typeface="+mn-lt"/>
-                <a:ea typeface="+mn-ea"/>
-                <a:cs typeface="+mn-cs"/>
-              </a:defRPr>
-            </a:lvl4pPr>
-            <a:lvl5pPr marL="2057400" indent="-228600" algn="l" defTabSz="914400" rtl="0" eaLnBrk="1" latinLnBrk="0" hangingPunct="1">
-              <a:lnSpc>
-                <a:spcPct val="90000"/>
-              </a:lnSpc>
-              <a:spcBef>
-                <a:spcPts val="500"/>
-              </a:spcBef>
-              <a:buFont typeface="Arial" panose="020B0604020202020204" pitchFamily="34" charset="0"/>
-              <a:buChar char="•"/>
-              <a:defRPr sz="1800" kern="1200">
-                <a:solidFill>
-                  <a:schemeClr val="tx1"/>
-                </a:solidFill>
-                <a:latin typeface="+mn-lt"/>
-                <a:ea typeface="+mn-ea"/>
-                <a:cs typeface="+mn-cs"/>
-              </a:defRPr>
-            </a:lvl5pPr>
-            <a:lvl6pPr marL="2514600" indent="-228600" algn="l" defTabSz="914400" rtl="0" eaLnBrk="1" latinLnBrk="0" hangingPunct="1">
-              <a:lnSpc>
-                <a:spcPct val="90000"/>
-              </a:lnSpc>
-              <a:spcBef>
-                <a:spcPts val="500"/>
-              </a:spcBef>
-              <a:buFont typeface="Arial" panose="020B0604020202020204" pitchFamily="34" charset="0"/>
-              <a:buChar char="•"/>
-              <a:defRPr sz="1800" kern="1200">
-                <a:solidFill>
-                  <a:schemeClr val="tx1"/>
-                </a:solidFill>
-                <a:latin typeface="+mn-lt"/>
-                <a:ea typeface="+mn-ea"/>
-                <a:cs typeface="+mn-cs"/>
-              </a:defRPr>
-            </a:lvl6pPr>
-            <a:lvl7pPr marL="2971800" indent="-228600" algn="l" defTabSz="914400" rtl="0" eaLnBrk="1" latinLnBrk="0" hangingPunct="1">
-              <a:lnSpc>
-                <a:spcPct val="90000"/>
-              </a:lnSpc>
-              <a:spcBef>
-                <a:spcPts val="500"/>
-              </a:spcBef>
-              <a:buFont typeface="Arial" panose="020B0604020202020204" pitchFamily="34" charset="0"/>
-              <a:buChar char="•"/>
-              <a:defRPr sz="1800" kern="1200">
-                <a:solidFill>
-                  <a:schemeClr val="tx1"/>
-                </a:solidFill>
-                <a:latin typeface="+mn-lt"/>
-                <a:ea typeface="+mn-ea"/>
-                <a:cs typeface="+mn-cs"/>
-              </a:defRPr>
-            </a:lvl7pPr>
-            <a:lvl8pPr marL="3429000" indent="-228600" algn="l" defTabSz="914400" rtl="0" eaLnBrk="1" latinLnBrk="0" hangingPunct="1">
-              <a:lnSpc>
-                <a:spcPct val="90000"/>
-              </a:lnSpc>
-              <a:spcBef>
-                <a:spcPts val="500"/>
-              </a:spcBef>
-              <a:buFont typeface="Arial" panose="020B0604020202020204" pitchFamily="34" charset="0"/>
-              <a:buChar char="•"/>
-              <a:defRPr sz="1800" kern="1200">
-                <a:solidFill>
-                  <a:schemeClr val="tx1"/>
-                </a:solidFill>
-                <a:latin typeface="+mn-lt"/>
-                <a:ea typeface="+mn-ea"/>
-                <a:cs typeface="+mn-cs"/>
-              </a:defRPr>
-            </a:lvl8pPr>
-            <a:lvl9pPr marL="3886200" indent="-228600" algn="l" defTabSz="914400" rtl="0" eaLnBrk="1" latinLnBrk="0" hangingPunct="1">
-              <a:lnSpc>
-                <a:spcPct val="90000"/>
-              </a:lnSpc>
-              <a:spcBef>
-                <a:spcPts val="500"/>
-              </a:spcBef>
-              <a:buFont typeface="Arial" panose="020B0604020202020204" pitchFamily="34" charset="0"/>
-              <a:buChar char="•"/>
-              <a:defRPr sz="1800" kern="1200">
-                <a:solidFill>
-                  <a:schemeClr val="tx1"/>
-                </a:solidFill>
-                <a:latin typeface="+mn-lt"/>
-                <a:ea typeface="+mn-ea"/>
-                <a:cs typeface="+mn-cs"/>
-              </a:defRPr>
-            </a:lvl9pPr>
-          </a:lstStyle>
-          <a:p>
-            <a:pPr marL="0" indent="0">
-              <a:buFont typeface="Arial" panose="020B0604020202020204" pitchFamily="34" charset="0"/>
-              <a:buNone/>
+          <a:lstStyle/>
+          <a:p>
+            <a:r>
+              <a:rPr lang="de-DE" sz="2000" dirty="0">
+                <a:latin typeface="+mj-lt"/>
+              </a:rPr>
+              <a:t>Data – </a:t>
+            </a:r>
+            <a:r>
+              <a:rPr lang="de-DE" sz="2000" dirty="0" err="1">
+                <a:latin typeface="+mj-lt"/>
+              </a:rPr>
+              <a:t>Starting</a:t>
+            </a:r>
+            <a:r>
+              <a:rPr lang="de-DE" sz="2000" dirty="0">
+                <a:latin typeface="+mj-lt"/>
+              </a:rPr>
+              <a:t> </a:t>
+            </a:r>
+            <a:r>
+              <a:rPr lang="de-DE" sz="2000" dirty="0" err="1">
+                <a:latin typeface="+mj-lt"/>
+              </a:rPr>
+              <a:t>point</a:t>
+            </a:r>
+            <a:endParaRPr lang="de-DE" sz="2000" dirty="0">
+              <a:latin typeface="+mj-lt"/>
+            </a:endParaRPr>
+          </a:p>
+        </p:txBody>
+      </p:sp>
+      <p:cxnSp>
+        <p:nvCxnSpPr>
+          <p:cNvPr id="43" name="Gerader Verbinder 42">
+            <a:extLst>
+              <a:ext uri="{FF2B5EF4-FFF2-40B4-BE49-F238E27FC236}">
+                <a16:creationId xmlns:a16="http://schemas.microsoft.com/office/drawing/2014/main" id="{C2DDA12A-9547-45C0-9F3E-DCFDEFE174C4}"/>
+              </a:ext>
+            </a:extLst>
+          </p:cNvPr>
+          <p:cNvCxnSpPr>
+            <a:cxnSpLocks/>
+          </p:cNvCxnSpPr>
+          <p:nvPr/>
+        </p:nvCxnSpPr>
+        <p:spPr>
+          <a:xfrm flipV="1">
+            <a:off x="6304110" y="1705904"/>
+            <a:ext cx="4641742" cy="20995"/>
+          </a:xfrm>
+          <a:prstGeom prst="line">
+            <a:avLst/>
+          </a:prstGeom>
+        </p:spPr>
+        <p:style>
+          <a:lnRef idx="1">
+            <a:schemeClr val="dk1"/>
+          </a:lnRef>
+          <a:fillRef idx="0">
+            <a:schemeClr val="dk1"/>
+          </a:fillRef>
+          <a:effectRef idx="0">
+            <a:schemeClr val="dk1"/>
+          </a:effectRef>
+          <a:fontRef idx="minor">
+            <a:schemeClr val="tx1"/>
+          </a:fontRef>
+        </p:style>
+      </p:cxnSp>
+      <p:sp>
+        <p:nvSpPr>
+          <p:cNvPr id="44" name="Textfeld 43">
+            <a:extLst>
+              <a:ext uri="{FF2B5EF4-FFF2-40B4-BE49-F238E27FC236}">
+                <a16:creationId xmlns:a16="http://schemas.microsoft.com/office/drawing/2014/main" id="{88E8E94E-2793-40BD-AA58-549436BAB122}"/>
+              </a:ext>
+            </a:extLst>
+          </p:cNvPr>
+          <p:cNvSpPr txBox="1"/>
+          <p:nvPr/>
+        </p:nvSpPr>
+        <p:spPr>
+          <a:xfrm>
+            <a:off x="6373554" y="4328291"/>
+            <a:ext cx="4073595" cy="1077218"/>
+          </a:xfrm>
+          <a:prstGeom prst="rect">
+            <a:avLst/>
+          </a:prstGeom>
+          <a:noFill/>
+        </p:spPr>
+        <p:txBody>
+          <a:bodyPr wrap="square" rtlCol="0">
+            <a:spAutoFit/>
+          </a:bodyPr>
+          <a:lstStyle/>
+          <a:p>
+            <a:pPr marL="285750" indent="-285750">
+              <a:buFont typeface="Wingdings" panose="05000000000000000000" pitchFamily="2" charset="2"/>
+              <a:buChar char="§"/>
             </a:pPr>
             <a:r>
-              <a:rPr lang="de-DE" dirty="0"/>
-              <a:t>Hier die Korrelationen darstellen</a:t>
+              <a:rPr lang="de-DE" sz="1600" dirty="0">
+                <a:latin typeface="+mj-lt"/>
+              </a:rPr>
+              <a:t>Historical Data </a:t>
+            </a:r>
+            <a:r>
+              <a:rPr lang="de-DE" sz="1600" dirty="0" err="1">
+                <a:latin typeface="+mj-lt"/>
+              </a:rPr>
+              <a:t>of</a:t>
+            </a:r>
+            <a:r>
+              <a:rPr lang="de-DE" sz="1600" dirty="0">
+                <a:latin typeface="+mj-lt"/>
+              </a:rPr>
+              <a:t> </a:t>
+            </a:r>
+            <a:r>
+              <a:rPr lang="de-DE" sz="1600" dirty="0" err="1">
+                <a:latin typeface="+mj-lt"/>
+              </a:rPr>
+              <a:t>survived</a:t>
+            </a:r>
+            <a:r>
+              <a:rPr lang="de-DE" sz="1600" dirty="0">
+                <a:latin typeface="+mj-lt"/>
+              </a:rPr>
+              <a:t> and insolvent </a:t>
+            </a:r>
+            <a:r>
+              <a:rPr lang="de-DE" sz="1600" dirty="0" err="1">
+                <a:latin typeface="+mj-lt"/>
+              </a:rPr>
+              <a:t>companies</a:t>
+            </a:r>
+            <a:r>
+              <a:rPr lang="de-DE" sz="1600" dirty="0">
+                <a:latin typeface="+mj-lt"/>
+              </a:rPr>
+              <a:t> after </a:t>
+            </a:r>
+            <a:r>
+              <a:rPr lang="de-DE" sz="1600" dirty="0" err="1">
+                <a:latin typeface="+mj-lt"/>
+              </a:rPr>
+              <a:t>one</a:t>
+            </a:r>
+            <a:r>
+              <a:rPr lang="de-DE" sz="1600" dirty="0">
+                <a:latin typeface="+mj-lt"/>
+              </a:rPr>
+              <a:t> </a:t>
+            </a:r>
+            <a:r>
+              <a:rPr lang="de-DE" sz="1600" dirty="0" err="1">
+                <a:latin typeface="+mj-lt"/>
+              </a:rPr>
+              <a:t>to</a:t>
+            </a:r>
+            <a:r>
+              <a:rPr lang="de-DE" sz="1600" dirty="0">
+                <a:latin typeface="+mj-lt"/>
+              </a:rPr>
+              <a:t> </a:t>
+            </a:r>
+            <a:r>
+              <a:rPr lang="de-DE" sz="1600" dirty="0" err="1">
+                <a:latin typeface="+mj-lt"/>
+              </a:rPr>
+              <a:t>five</a:t>
+            </a:r>
+            <a:r>
+              <a:rPr lang="de-DE" sz="1600" dirty="0">
+                <a:latin typeface="+mj-lt"/>
+              </a:rPr>
+              <a:t> </a:t>
+            </a:r>
+            <a:r>
+              <a:rPr lang="de-DE" sz="1600" dirty="0" err="1">
+                <a:latin typeface="+mj-lt"/>
+              </a:rPr>
+              <a:t>years</a:t>
+            </a:r>
+            <a:r>
+              <a:rPr lang="de-DE" sz="1600" dirty="0">
+                <a:latin typeface="+mj-lt"/>
+              </a:rPr>
+              <a:t>. </a:t>
+            </a:r>
+          </a:p>
+          <a:p>
+            <a:pPr marL="285750" indent="-285750">
+              <a:buFont typeface="Wingdings" panose="05000000000000000000" pitchFamily="2" charset="2"/>
+              <a:buChar char="§"/>
+            </a:pPr>
+            <a:r>
+              <a:rPr lang="de-DE" sz="1600" dirty="0">
+                <a:latin typeface="+mj-lt"/>
+              </a:rPr>
+              <a:t>Data </a:t>
+            </a:r>
+            <a:r>
+              <a:rPr lang="de-DE" sz="1600" dirty="0" err="1">
+                <a:latin typeface="+mj-lt"/>
+              </a:rPr>
+              <a:t>seems</a:t>
+            </a:r>
+            <a:r>
+              <a:rPr lang="de-DE" sz="1600" dirty="0">
+                <a:latin typeface="+mj-lt"/>
+              </a:rPr>
+              <a:t> </a:t>
+            </a:r>
+            <a:r>
+              <a:rPr lang="de-DE" sz="1600" dirty="0" err="1">
+                <a:latin typeface="+mj-lt"/>
+              </a:rPr>
+              <a:t>to</a:t>
+            </a:r>
+            <a:r>
+              <a:rPr lang="de-DE" sz="1600" dirty="0">
+                <a:latin typeface="+mj-lt"/>
+              </a:rPr>
+              <a:t> </a:t>
+            </a:r>
+            <a:r>
+              <a:rPr lang="de-DE" sz="1600" dirty="0" err="1">
+                <a:latin typeface="+mj-lt"/>
+              </a:rPr>
+              <a:t>be</a:t>
+            </a:r>
+            <a:r>
+              <a:rPr lang="de-DE" sz="1600" dirty="0">
+                <a:latin typeface="+mj-lt"/>
+              </a:rPr>
+              <a:t> </a:t>
+            </a:r>
+            <a:r>
+              <a:rPr lang="de-DE" sz="1600" dirty="0" err="1">
+                <a:latin typeface="+mj-lt"/>
+              </a:rPr>
+              <a:t>consistent</a:t>
+            </a:r>
+            <a:r>
+              <a:rPr lang="de-DE" sz="1600" dirty="0">
+                <a:latin typeface="+mj-lt"/>
+              </a:rPr>
+              <a:t> </a:t>
+            </a:r>
+            <a:r>
+              <a:rPr lang="de-DE" sz="1600" dirty="0" err="1">
+                <a:latin typeface="+mj-lt"/>
+              </a:rPr>
+              <a:t>since</a:t>
+            </a:r>
+            <a:r>
+              <a:rPr lang="de-DE" sz="1600" dirty="0">
+                <a:latin typeface="+mj-lt"/>
+              </a:rPr>
+              <a:t> </a:t>
+            </a:r>
+            <a:r>
+              <a:rPr lang="de-DE" sz="1600" dirty="0" err="1">
+                <a:latin typeface="+mj-lt"/>
+              </a:rPr>
+              <a:t>the</a:t>
+            </a:r>
+            <a:r>
+              <a:rPr lang="de-DE" sz="1600" dirty="0">
+                <a:latin typeface="+mj-lt"/>
+              </a:rPr>
+              <a:t> </a:t>
+            </a:r>
+            <a:r>
+              <a:rPr lang="de-DE" sz="1600" dirty="0" err="1">
+                <a:latin typeface="+mj-lt"/>
+              </a:rPr>
+              <a:t>share</a:t>
+            </a:r>
+            <a:r>
+              <a:rPr lang="de-DE" sz="1600" dirty="0">
+                <a:latin typeface="+mj-lt"/>
+              </a:rPr>
+              <a:t> </a:t>
+            </a:r>
+            <a:r>
+              <a:rPr lang="de-DE" sz="1600" dirty="0" err="1">
+                <a:latin typeface="+mj-lt"/>
+              </a:rPr>
+              <a:t>of</a:t>
+            </a:r>
+            <a:r>
+              <a:rPr lang="de-DE" sz="1600" dirty="0">
+                <a:latin typeface="+mj-lt"/>
+              </a:rPr>
+              <a:t> </a:t>
+            </a:r>
+            <a:r>
+              <a:rPr lang="de-DE" sz="1600" dirty="0" err="1">
+                <a:latin typeface="+mj-lt"/>
+              </a:rPr>
+              <a:t>bankrupt</a:t>
+            </a:r>
+            <a:r>
+              <a:rPr lang="de-DE" sz="1600" dirty="0">
+                <a:latin typeface="+mj-lt"/>
+              </a:rPr>
+              <a:t> </a:t>
+            </a:r>
+            <a:r>
+              <a:rPr lang="de-DE" sz="1600" dirty="0" err="1">
+                <a:latin typeface="+mj-lt"/>
+              </a:rPr>
+              <a:t>companies</a:t>
+            </a:r>
+            <a:r>
+              <a:rPr lang="de-DE" sz="1600" dirty="0">
+                <a:latin typeface="+mj-lt"/>
+              </a:rPr>
+              <a:t> </a:t>
+            </a:r>
+            <a:r>
+              <a:rPr lang="de-DE" sz="1600" dirty="0" err="1">
+                <a:latin typeface="+mj-lt"/>
+              </a:rPr>
+              <a:t>increases</a:t>
+            </a:r>
+            <a:r>
+              <a:rPr lang="de-DE" sz="1600" dirty="0">
+                <a:latin typeface="+mj-lt"/>
+              </a:rPr>
+              <a:t> </a:t>
+            </a:r>
+            <a:r>
+              <a:rPr lang="de-DE" sz="1600" dirty="0" err="1">
+                <a:latin typeface="+mj-lt"/>
+              </a:rPr>
+              <a:t>with</a:t>
+            </a:r>
+            <a:r>
+              <a:rPr lang="de-DE" sz="1600" dirty="0">
+                <a:latin typeface="+mj-lt"/>
+              </a:rPr>
+              <a:t> time</a:t>
             </a:r>
           </a:p>
         </p:txBody>
@@ -6279,6 +7339,532 @@
     <p:extLst>
       <p:ext uri="{BB962C8B-B14F-4D97-AF65-F5344CB8AC3E}">
         <p14:creationId xmlns:p14="http://schemas.microsoft.com/office/powerpoint/2010/main" val="2742382979"/>
+      </p:ext>
+    </p:extLst>
+  </p:cSld>
+  <p:clrMapOvr>
+    <a:masterClrMapping/>
+  </p:clrMapOvr>
+</p:sld>
+</file>
+
+<file path=ppt/slides/slide7.xml><?xml version="1.0" encoding="utf-8"?>
+<p:sld xmlns:a="http://schemas.openxmlformats.org/drawingml/2006/main" xmlns:r="http://schemas.openxmlformats.org/officeDocument/2006/relationships" xmlns:p="http://schemas.openxmlformats.org/presentationml/2006/main">
+  <p:cSld>
+    <p:spTree>
+      <p:nvGrpSpPr>
+        <p:cNvPr id="1" name=""/>
+        <p:cNvGrpSpPr/>
+        <p:nvPr/>
+      </p:nvGrpSpPr>
+      <p:grpSpPr>
+        <a:xfrm>
+          <a:off x="0" y="0"/>
+          <a:ext cx="0" cy="0"/>
+          <a:chOff x="0" y="0"/>
+          <a:chExt cx="0" cy="0"/>
+        </a:xfrm>
+      </p:grpSpPr>
+      <p:sp>
+        <p:nvSpPr>
+          <p:cNvPr id="4" name="Titel 3">
+            <a:extLst>
+              <a:ext uri="{FF2B5EF4-FFF2-40B4-BE49-F238E27FC236}">
+                <a16:creationId xmlns:a16="http://schemas.microsoft.com/office/drawing/2014/main" id="{DF525FEB-9A3A-4B44-8317-78A8A253F77A}"/>
+              </a:ext>
+            </a:extLst>
+          </p:cNvPr>
+          <p:cNvSpPr>
+            <a:spLocks noGrp="1"/>
+          </p:cNvSpPr>
+          <p:nvPr>
+            <p:ph type="title"/>
+          </p:nvPr>
+        </p:nvSpPr>
+        <p:spPr>
+          <a:xfrm>
+            <a:off x="838200" y="132651"/>
+            <a:ext cx="10515600" cy="646140"/>
+          </a:xfrm>
+        </p:spPr>
+        <p:txBody>
+          <a:bodyPr>
+            <a:normAutofit fontScale="90000"/>
+          </a:bodyPr>
+          <a:lstStyle/>
+          <a:p>
+            <a:r>
+              <a:rPr lang="de-DE" dirty="0"/>
+              <a:t>Next </a:t>
+            </a:r>
+            <a:r>
+              <a:rPr lang="de-DE" dirty="0" err="1"/>
+              <a:t>Steps</a:t>
+            </a:r>
+            <a:endParaRPr lang="de-DE" dirty="0"/>
+          </a:p>
+        </p:txBody>
+      </p:sp>
+      <p:sp>
+        <p:nvSpPr>
+          <p:cNvPr id="5" name="Inhaltsplatzhalter 4">
+            <a:extLst>
+              <a:ext uri="{FF2B5EF4-FFF2-40B4-BE49-F238E27FC236}">
+                <a16:creationId xmlns:a16="http://schemas.microsoft.com/office/drawing/2014/main" id="{0F615D91-DCC0-42C6-85C6-0960A564BE37}"/>
+              </a:ext>
+            </a:extLst>
+          </p:cNvPr>
+          <p:cNvSpPr>
+            <a:spLocks noGrp="1"/>
+          </p:cNvSpPr>
+          <p:nvPr>
+            <p:ph idx="1"/>
+          </p:nvPr>
+        </p:nvSpPr>
+        <p:spPr>
+          <a:xfrm>
+            <a:off x="838200" y="4185563"/>
+            <a:ext cx="7329407" cy="894328"/>
+          </a:xfrm>
+        </p:spPr>
+        <p:txBody>
+          <a:bodyPr/>
+          <a:lstStyle/>
+          <a:p>
+            <a:pPr marL="0" indent="0">
+              <a:buNone/>
+            </a:pPr>
+            <a:r>
+              <a:rPr lang="de-DE" dirty="0"/>
+              <a:t>Hier Ergebnisse der Feature </a:t>
+            </a:r>
+            <a:r>
+              <a:rPr lang="de-DE" dirty="0" err="1"/>
+              <a:t>Selection</a:t>
+            </a:r>
+            <a:endParaRPr lang="de-DE" dirty="0"/>
+          </a:p>
+        </p:txBody>
+      </p:sp>
+      <p:sp>
+        <p:nvSpPr>
+          <p:cNvPr id="6" name="Titel 3">
+            <a:extLst>
+              <a:ext uri="{FF2B5EF4-FFF2-40B4-BE49-F238E27FC236}">
+                <a16:creationId xmlns:a16="http://schemas.microsoft.com/office/drawing/2014/main" id="{184ABA1D-901D-46EF-B342-1D914341B95A}"/>
+              </a:ext>
+            </a:extLst>
+          </p:cNvPr>
+          <p:cNvSpPr txBox="1">
+            <a:spLocks/>
+          </p:cNvSpPr>
+          <p:nvPr/>
+        </p:nvSpPr>
+        <p:spPr>
+          <a:xfrm>
+            <a:off x="789122" y="691270"/>
+            <a:ext cx="10515600" cy="646140"/>
+          </a:xfrm>
+          <a:prstGeom prst="rect">
+            <a:avLst/>
+          </a:prstGeom>
+        </p:spPr>
+        <p:txBody>
+          <a:bodyPr vert="horz" lIns="91440" tIns="45720" rIns="91440" bIns="45720" rtlCol="0" anchor="ctr">
+            <a:normAutofit fontScale="97500" lnSpcReduction="10000"/>
+          </a:bodyPr>
+          <a:lstStyle>
+            <a:lvl1pPr algn="l" defTabSz="914400" rtl="0" eaLnBrk="1" latinLnBrk="0" hangingPunct="1">
+              <a:lnSpc>
+                <a:spcPct val="90000"/>
+              </a:lnSpc>
+              <a:spcBef>
+                <a:spcPct val="0"/>
+              </a:spcBef>
+              <a:buNone/>
+              <a:defRPr sz="4400" kern="1200">
+                <a:solidFill>
+                  <a:schemeClr val="tx1"/>
+                </a:solidFill>
+                <a:latin typeface="+mj-lt"/>
+                <a:ea typeface="+mj-ea"/>
+                <a:cs typeface="+mj-cs"/>
+              </a:defRPr>
+            </a:lvl1pPr>
+          </a:lstStyle>
+          <a:p>
+            <a:endParaRPr lang="de-DE" dirty="0"/>
+          </a:p>
+        </p:txBody>
+      </p:sp>
+      <p:sp>
+        <p:nvSpPr>
+          <p:cNvPr id="7" name="Titel 3">
+            <a:extLst>
+              <a:ext uri="{FF2B5EF4-FFF2-40B4-BE49-F238E27FC236}">
+                <a16:creationId xmlns:a16="http://schemas.microsoft.com/office/drawing/2014/main" id="{8FFFBFA7-2967-4206-BCCD-A38584B24862}"/>
+              </a:ext>
+            </a:extLst>
+          </p:cNvPr>
+          <p:cNvSpPr txBox="1">
+            <a:spLocks/>
+          </p:cNvSpPr>
+          <p:nvPr/>
+        </p:nvSpPr>
+        <p:spPr>
+          <a:xfrm>
+            <a:off x="789122" y="778791"/>
+            <a:ext cx="10515600" cy="646140"/>
+          </a:xfrm>
+          <a:prstGeom prst="rect">
+            <a:avLst/>
+          </a:prstGeom>
+        </p:spPr>
+        <p:txBody>
+          <a:bodyPr vert="horz" lIns="91440" tIns="45720" rIns="91440" bIns="45720" rtlCol="0" anchor="ctr">
+            <a:normAutofit fontScale="97500"/>
+          </a:bodyPr>
+          <a:lstStyle>
+            <a:lvl1pPr algn="l" defTabSz="914400" rtl="0" eaLnBrk="1" latinLnBrk="0" hangingPunct="1">
+              <a:lnSpc>
+                <a:spcPct val="90000"/>
+              </a:lnSpc>
+              <a:spcBef>
+                <a:spcPct val="0"/>
+              </a:spcBef>
+              <a:buNone/>
+              <a:defRPr sz="4400" kern="1200">
+                <a:solidFill>
+                  <a:schemeClr val="tx1"/>
+                </a:solidFill>
+                <a:latin typeface="+mj-lt"/>
+                <a:ea typeface="+mj-ea"/>
+                <a:cs typeface="+mj-cs"/>
+              </a:defRPr>
+            </a:lvl1pPr>
+          </a:lstStyle>
+          <a:p>
+            <a:endParaRPr lang="de-DE" sz="3200" dirty="0"/>
+          </a:p>
+        </p:txBody>
+      </p:sp>
+      <p:sp>
+        <p:nvSpPr>
+          <p:cNvPr id="8" name="Titel 3">
+            <a:extLst>
+              <a:ext uri="{FF2B5EF4-FFF2-40B4-BE49-F238E27FC236}">
+                <a16:creationId xmlns:a16="http://schemas.microsoft.com/office/drawing/2014/main" id="{BBD9690B-01D5-485D-B4FA-29FC11C016E7}"/>
+              </a:ext>
+            </a:extLst>
+          </p:cNvPr>
+          <p:cNvSpPr txBox="1">
+            <a:spLocks/>
+          </p:cNvSpPr>
+          <p:nvPr/>
+        </p:nvSpPr>
+        <p:spPr>
+          <a:xfrm>
+            <a:off x="838200" y="778791"/>
+            <a:ext cx="10515600" cy="400694"/>
+          </a:xfrm>
+          <a:prstGeom prst="rect">
+            <a:avLst/>
+          </a:prstGeom>
+        </p:spPr>
+        <p:txBody>
+          <a:bodyPr vert="horz" lIns="91440" tIns="45720" rIns="91440" bIns="45720" rtlCol="0" anchor="ctr">
+            <a:normAutofit fontScale="60000" lnSpcReduction="20000"/>
+          </a:bodyPr>
+          <a:lstStyle>
+            <a:lvl1pPr algn="l" defTabSz="914400" rtl="0" eaLnBrk="1" latinLnBrk="0" hangingPunct="1">
+              <a:lnSpc>
+                <a:spcPct val="90000"/>
+              </a:lnSpc>
+              <a:spcBef>
+                <a:spcPct val="0"/>
+              </a:spcBef>
+              <a:buNone/>
+              <a:defRPr sz="4400" kern="1200">
+                <a:solidFill>
+                  <a:schemeClr val="tx1"/>
+                </a:solidFill>
+                <a:latin typeface="+mj-lt"/>
+                <a:ea typeface="+mj-ea"/>
+                <a:cs typeface="+mj-cs"/>
+              </a:defRPr>
+            </a:lvl1pPr>
+          </a:lstStyle>
+          <a:p>
+            <a:endParaRPr lang="de-DE" dirty="0"/>
+          </a:p>
+        </p:txBody>
+      </p:sp>
+      <p:sp>
+        <p:nvSpPr>
+          <p:cNvPr id="9" name="Titel 3">
+            <a:extLst>
+              <a:ext uri="{FF2B5EF4-FFF2-40B4-BE49-F238E27FC236}">
+                <a16:creationId xmlns:a16="http://schemas.microsoft.com/office/drawing/2014/main" id="{AF35CB24-B4F2-4A70-85CA-8FFC67F899AD}"/>
+              </a:ext>
+            </a:extLst>
+          </p:cNvPr>
+          <p:cNvSpPr txBox="1">
+            <a:spLocks/>
+          </p:cNvSpPr>
+          <p:nvPr/>
+        </p:nvSpPr>
+        <p:spPr>
+          <a:xfrm>
+            <a:off x="838200" y="852637"/>
+            <a:ext cx="10515600" cy="646140"/>
+          </a:xfrm>
+          <a:prstGeom prst="rect">
+            <a:avLst/>
+          </a:prstGeom>
+        </p:spPr>
+        <p:txBody>
+          <a:bodyPr vert="horz" lIns="91440" tIns="45720" rIns="91440" bIns="45720" rtlCol="0" anchor="ctr">
+            <a:normAutofit fontScale="97500"/>
+          </a:bodyPr>
+          <a:lstStyle>
+            <a:lvl1pPr algn="l" defTabSz="914400" rtl="0" eaLnBrk="1" latinLnBrk="0" hangingPunct="1">
+              <a:lnSpc>
+                <a:spcPct val="90000"/>
+              </a:lnSpc>
+              <a:spcBef>
+                <a:spcPct val="0"/>
+              </a:spcBef>
+              <a:buNone/>
+              <a:defRPr sz="4400" kern="1200">
+                <a:solidFill>
+                  <a:schemeClr val="tx1"/>
+                </a:solidFill>
+                <a:latin typeface="+mj-lt"/>
+                <a:ea typeface="+mj-ea"/>
+                <a:cs typeface="+mj-cs"/>
+              </a:defRPr>
+            </a:lvl1pPr>
+          </a:lstStyle>
+          <a:p>
+            <a:r>
+              <a:rPr lang="de-DE" sz="3700" dirty="0" err="1"/>
+              <a:t>results</a:t>
+            </a:r>
+            <a:endParaRPr lang="de-DE" dirty="0"/>
+          </a:p>
+        </p:txBody>
+      </p:sp>
+      <p:sp>
+        <p:nvSpPr>
+          <p:cNvPr id="10" name="Inhaltsplatzhalter 4">
+            <a:extLst>
+              <a:ext uri="{FF2B5EF4-FFF2-40B4-BE49-F238E27FC236}">
+                <a16:creationId xmlns:a16="http://schemas.microsoft.com/office/drawing/2014/main" id="{BD982A2F-6CC1-46FB-95F6-8EA7E2FB6D68}"/>
+              </a:ext>
+            </a:extLst>
+          </p:cNvPr>
+          <p:cNvSpPr txBox="1">
+            <a:spLocks/>
+          </p:cNvSpPr>
+          <p:nvPr/>
+        </p:nvSpPr>
+        <p:spPr>
+          <a:xfrm>
+            <a:off x="789122" y="2357733"/>
+            <a:ext cx="7329407" cy="894328"/>
+          </a:xfrm>
+          <a:prstGeom prst="rect">
+            <a:avLst/>
+          </a:prstGeom>
+        </p:spPr>
+        <p:txBody>
+          <a:bodyPr vert="horz" lIns="91440" tIns="45720" rIns="91440" bIns="45720" rtlCol="0">
+            <a:normAutofit/>
+          </a:bodyPr>
+          <a:lstStyle>
+            <a:lvl1pPr marL="228600" indent="-228600" algn="l" defTabSz="914400" rtl="0" eaLnBrk="1" latinLnBrk="0" hangingPunct="1">
+              <a:lnSpc>
+                <a:spcPct val="90000"/>
+              </a:lnSpc>
+              <a:spcBef>
+                <a:spcPts val="1000"/>
+              </a:spcBef>
+              <a:buFont typeface="Arial" panose="020B0604020202020204" pitchFamily="34" charset="0"/>
+              <a:buChar char="•"/>
+              <a:defRPr sz="2800" kern="1200">
+                <a:solidFill>
+                  <a:schemeClr val="tx1"/>
+                </a:solidFill>
+                <a:latin typeface="+mn-lt"/>
+                <a:ea typeface="+mn-ea"/>
+                <a:cs typeface="+mn-cs"/>
+              </a:defRPr>
+            </a:lvl1pPr>
+            <a:lvl2pPr marL="685800" indent="-228600" algn="l" defTabSz="914400" rtl="0" eaLnBrk="1" latinLnBrk="0" hangingPunct="1">
+              <a:lnSpc>
+                <a:spcPct val="90000"/>
+              </a:lnSpc>
+              <a:spcBef>
+                <a:spcPts val="500"/>
+              </a:spcBef>
+              <a:buFont typeface="Arial" panose="020B0604020202020204" pitchFamily="34" charset="0"/>
+              <a:buChar char="•"/>
+              <a:defRPr sz="2400" kern="1200">
+                <a:solidFill>
+                  <a:schemeClr val="tx1"/>
+                </a:solidFill>
+                <a:latin typeface="+mn-lt"/>
+                <a:ea typeface="+mn-ea"/>
+                <a:cs typeface="+mn-cs"/>
+              </a:defRPr>
+            </a:lvl2pPr>
+            <a:lvl3pPr marL="1143000" indent="-228600" algn="l" defTabSz="914400" rtl="0" eaLnBrk="1" latinLnBrk="0" hangingPunct="1">
+              <a:lnSpc>
+                <a:spcPct val="90000"/>
+              </a:lnSpc>
+              <a:spcBef>
+                <a:spcPts val="500"/>
+              </a:spcBef>
+              <a:buFont typeface="Arial" panose="020B0604020202020204" pitchFamily="34" charset="0"/>
+              <a:buChar char="•"/>
+              <a:defRPr sz="2000" kern="1200">
+                <a:solidFill>
+                  <a:schemeClr val="tx1"/>
+                </a:solidFill>
+                <a:latin typeface="+mn-lt"/>
+                <a:ea typeface="+mn-ea"/>
+                <a:cs typeface="+mn-cs"/>
+              </a:defRPr>
+            </a:lvl3pPr>
+            <a:lvl4pPr marL="1600200" indent="-228600" algn="l" defTabSz="914400" rtl="0" eaLnBrk="1" latinLnBrk="0" hangingPunct="1">
+              <a:lnSpc>
+                <a:spcPct val="90000"/>
+              </a:lnSpc>
+              <a:spcBef>
+                <a:spcPts val="500"/>
+              </a:spcBef>
+              <a:buFont typeface="Arial" panose="020B0604020202020204" pitchFamily="34" charset="0"/>
+              <a:buChar char="•"/>
+              <a:defRPr sz="1800" kern="1200">
+                <a:solidFill>
+                  <a:schemeClr val="tx1"/>
+                </a:solidFill>
+                <a:latin typeface="+mn-lt"/>
+                <a:ea typeface="+mn-ea"/>
+                <a:cs typeface="+mn-cs"/>
+              </a:defRPr>
+            </a:lvl4pPr>
+            <a:lvl5pPr marL="2057400" indent="-228600" algn="l" defTabSz="914400" rtl="0" eaLnBrk="1" latinLnBrk="0" hangingPunct="1">
+              <a:lnSpc>
+                <a:spcPct val="90000"/>
+              </a:lnSpc>
+              <a:spcBef>
+                <a:spcPts val="500"/>
+              </a:spcBef>
+              <a:buFont typeface="Arial" panose="020B0604020202020204" pitchFamily="34" charset="0"/>
+              <a:buChar char="•"/>
+              <a:defRPr sz="1800" kern="1200">
+                <a:solidFill>
+                  <a:schemeClr val="tx1"/>
+                </a:solidFill>
+                <a:latin typeface="+mn-lt"/>
+                <a:ea typeface="+mn-ea"/>
+                <a:cs typeface="+mn-cs"/>
+              </a:defRPr>
+            </a:lvl5pPr>
+            <a:lvl6pPr marL="2514600" indent="-228600" algn="l" defTabSz="914400" rtl="0" eaLnBrk="1" latinLnBrk="0" hangingPunct="1">
+              <a:lnSpc>
+                <a:spcPct val="90000"/>
+              </a:lnSpc>
+              <a:spcBef>
+                <a:spcPts val="500"/>
+              </a:spcBef>
+              <a:buFont typeface="Arial" panose="020B0604020202020204" pitchFamily="34" charset="0"/>
+              <a:buChar char="•"/>
+              <a:defRPr sz="1800" kern="1200">
+                <a:solidFill>
+                  <a:schemeClr val="tx1"/>
+                </a:solidFill>
+                <a:latin typeface="+mn-lt"/>
+                <a:ea typeface="+mn-ea"/>
+                <a:cs typeface="+mn-cs"/>
+              </a:defRPr>
+            </a:lvl6pPr>
+            <a:lvl7pPr marL="2971800" indent="-228600" algn="l" defTabSz="914400" rtl="0" eaLnBrk="1" latinLnBrk="0" hangingPunct="1">
+              <a:lnSpc>
+                <a:spcPct val="90000"/>
+              </a:lnSpc>
+              <a:spcBef>
+                <a:spcPts val="500"/>
+              </a:spcBef>
+              <a:buFont typeface="Arial" panose="020B0604020202020204" pitchFamily="34" charset="0"/>
+              <a:buChar char="•"/>
+              <a:defRPr sz="1800" kern="1200">
+                <a:solidFill>
+                  <a:schemeClr val="tx1"/>
+                </a:solidFill>
+                <a:latin typeface="+mn-lt"/>
+                <a:ea typeface="+mn-ea"/>
+                <a:cs typeface="+mn-cs"/>
+              </a:defRPr>
+            </a:lvl7pPr>
+            <a:lvl8pPr marL="3429000" indent="-228600" algn="l" defTabSz="914400" rtl="0" eaLnBrk="1" latinLnBrk="0" hangingPunct="1">
+              <a:lnSpc>
+                <a:spcPct val="90000"/>
+              </a:lnSpc>
+              <a:spcBef>
+                <a:spcPts val="500"/>
+              </a:spcBef>
+              <a:buFont typeface="Arial" panose="020B0604020202020204" pitchFamily="34" charset="0"/>
+              <a:buChar char="•"/>
+              <a:defRPr sz="1800" kern="1200">
+                <a:solidFill>
+                  <a:schemeClr val="tx1"/>
+                </a:solidFill>
+                <a:latin typeface="+mn-lt"/>
+                <a:ea typeface="+mn-ea"/>
+                <a:cs typeface="+mn-cs"/>
+              </a:defRPr>
+            </a:lvl8pPr>
+            <a:lvl9pPr marL="3886200" indent="-228600" algn="l" defTabSz="914400" rtl="0" eaLnBrk="1" latinLnBrk="0" hangingPunct="1">
+              <a:lnSpc>
+                <a:spcPct val="90000"/>
+              </a:lnSpc>
+              <a:spcBef>
+                <a:spcPts val="500"/>
+              </a:spcBef>
+              <a:buFont typeface="Arial" panose="020B0604020202020204" pitchFamily="34" charset="0"/>
+              <a:buChar char="•"/>
+              <a:defRPr sz="1800" kern="1200">
+                <a:solidFill>
+                  <a:schemeClr val="tx1"/>
+                </a:solidFill>
+                <a:latin typeface="+mn-lt"/>
+                <a:ea typeface="+mn-ea"/>
+                <a:cs typeface="+mn-cs"/>
+              </a:defRPr>
+            </a:lvl9pPr>
+          </a:lstStyle>
+          <a:p>
+            <a:pPr marL="0" indent="0">
+              <a:buFont typeface="Arial" panose="020B0604020202020204" pitchFamily="34" charset="0"/>
+              <a:buNone/>
+            </a:pPr>
+            <a:r>
+              <a:rPr lang="de-DE" dirty="0" err="1"/>
+              <a:t>Measures</a:t>
+            </a:r>
+            <a:r>
+              <a:rPr lang="de-DE" dirty="0"/>
+              <a:t> im Zeitverlauf darstellen</a:t>
+            </a:r>
+          </a:p>
+        </p:txBody>
+      </p:sp>
+    </p:spTree>
+    <p:extLst>
+      <p:ext uri="{BB962C8B-B14F-4D97-AF65-F5344CB8AC3E}">
+        <p14:creationId xmlns:p14="http://schemas.microsoft.com/office/powerpoint/2010/main" val="2573005885"/>
       </p:ext>
     </p:extLst>
   </p:cSld>

</xml_diff>